<commit_message>
Adding shapefiles from DISPLACE_outputs
</commit_message>
<xml_diff>
--- a/WKTRADE2_R_workflow.pptx
+++ b/WKTRADE2_R_workflow.pptx
@@ -2,7 +2,7 @@
 <file path=ppt/presentation.xml><?xml version="1.0" encoding="utf-8"?>
 <p:presentation xmlns:a="http://schemas.openxmlformats.org/drawingml/2006/main" xmlns:r="http://schemas.openxmlformats.org/officeDocument/2006/relationships" xmlns:p="http://schemas.openxmlformats.org/presentationml/2006/main" saveSubsetFonts="1">
   <p:sldMasterIdLst>
-    <p:sldMasterId id="2147483660" r:id="rId1"/>
+    <p:sldMasterId id="2147483718" r:id="rId1"/>
   </p:sldMasterIdLst>
   <p:sldIdLst>
     <p:sldId id="256" r:id="rId2"/>
@@ -300,7 +300,7 @@
           <a:p>
             <a:fld id="{0804A3E0-26E0-4A89-A33E-47059F87E0AD}" type="datetimeFigureOut">
               <a:rPr lang="da-DK" smtClean="0"/>
-              <a:t>19-08-2019</a:t>
+              <a:t>23-08-2019</a:t>
             </a:fld>
             <a:endParaRPr lang="da-DK"/>
           </a:p>
@@ -438,7 +438,7 @@
     </p:spTree>
     <p:extLst>
       <p:ext uri="{BB962C8B-B14F-4D97-AF65-F5344CB8AC3E}">
-        <p14:creationId xmlns:p14="http://schemas.microsoft.com/office/powerpoint/2010/main" val="4055134488"/>
+        <p14:creationId xmlns:p14="http://schemas.microsoft.com/office/powerpoint/2010/main" val="2789609913"/>
       </p:ext>
     </p:extLst>
   </p:cSld>
@@ -638,7 +638,7 @@
           <a:p>
             <a:fld id="{0804A3E0-26E0-4A89-A33E-47059F87E0AD}" type="datetimeFigureOut">
               <a:rPr lang="da-DK" smtClean="0"/>
-              <a:t>19-08-2019</a:t>
+              <a:t>23-08-2019</a:t>
             </a:fld>
             <a:endParaRPr lang="da-DK"/>
           </a:p>
@@ -776,7 +776,7 @@
     </p:spTree>
     <p:extLst>
       <p:ext uri="{BB962C8B-B14F-4D97-AF65-F5344CB8AC3E}">
-        <p14:creationId xmlns:p14="http://schemas.microsoft.com/office/powerpoint/2010/main" val="1163152970"/>
+        <p14:creationId xmlns:p14="http://schemas.microsoft.com/office/powerpoint/2010/main" val="928476629"/>
       </p:ext>
     </p:extLst>
   </p:cSld>
@@ -1039,7 +1039,7 @@
           <a:p>
             <a:fld id="{0804A3E0-26E0-4A89-A33E-47059F87E0AD}" type="datetimeFigureOut">
               <a:rPr lang="da-DK" smtClean="0"/>
-              <a:t>19-08-2019</a:t>
+              <a:t>23-08-2019</a:t>
             </a:fld>
             <a:endParaRPr lang="da-DK"/>
           </a:p>
@@ -1253,7 +1253,7 @@
     </p:spTree>
     <p:extLst>
       <p:ext uri="{BB962C8B-B14F-4D97-AF65-F5344CB8AC3E}">
-        <p14:creationId xmlns:p14="http://schemas.microsoft.com/office/powerpoint/2010/main" val="2815612599"/>
+        <p14:creationId xmlns:p14="http://schemas.microsoft.com/office/powerpoint/2010/main" val="2609847848"/>
       </p:ext>
     </p:extLst>
   </p:cSld>
@@ -1375,7 +1375,7 @@
           <a:p>
             <a:fld id="{0804A3E0-26E0-4A89-A33E-47059F87E0AD}" type="datetimeFigureOut">
               <a:rPr lang="da-DK" smtClean="0"/>
-              <a:t>19-08-2019</a:t>
+              <a:t>23-08-2019</a:t>
             </a:fld>
             <a:endParaRPr lang="da-DK"/>
           </a:p>
@@ -1513,7 +1513,7 @@
     </p:spTree>
     <p:extLst>
       <p:ext uri="{BB962C8B-B14F-4D97-AF65-F5344CB8AC3E}">
-        <p14:creationId xmlns:p14="http://schemas.microsoft.com/office/powerpoint/2010/main" val="3279018253"/>
+        <p14:creationId xmlns:p14="http://schemas.microsoft.com/office/powerpoint/2010/main" val="103284609"/>
       </p:ext>
     </p:extLst>
   </p:cSld>
@@ -1695,7 +1695,7 @@
           <a:p>
             <a:fld id="{0804A3E0-26E0-4A89-A33E-47059F87E0AD}" type="datetimeFigureOut">
               <a:rPr lang="da-DK" smtClean="0"/>
-              <a:t>19-08-2019</a:t>
+              <a:t>23-08-2019</a:t>
             </a:fld>
             <a:endParaRPr lang="da-DK"/>
           </a:p>
@@ -1909,7 +1909,7 @@
     </p:spTree>
     <p:extLst>
       <p:ext uri="{BB962C8B-B14F-4D97-AF65-F5344CB8AC3E}">
-        <p14:creationId xmlns:p14="http://schemas.microsoft.com/office/powerpoint/2010/main" val="1646907978"/>
+        <p14:creationId xmlns:p14="http://schemas.microsoft.com/office/powerpoint/2010/main" val="1327842531"/>
       </p:ext>
     </p:extLst>
   </p:cSld>
@@ -2091,7 +2091,7 @@
           <a:p>
             <a:fld id="{0804A3E0-26E0-4A89-A33E-47059F87E0AD}" type="datetimeFigureOut">
               <a:rPr lang="da-DK" smtClean="0"/>
-              <a:t>19-08-2019</a:t>
+              <a:t>23-08-2019</a:t>
             </a:fld>
             <a:endParaRPr lang="da-DK"/>
           </a:p>
@@ -2229,7 +2229,7 @@
     </p:spTree>
     <p:extLst>
       <p:ext uri="{BB962C8B-B14F-4D97-AF65-F5344CB8AC3E}">
-        <p14:creationId xmlns:p14="http://schemas.microsoft.com/office/powerpoint/2010/main" val="188731484"/>
+        <p14:creationId xmlns:p14="http://schemas.microsoft.com/office/powerpoint/2010/main" val="83372708"/>
       </p:ext>
     </p:extLst>
   </p:cSld>
@@ -2348,7 +2348,7 @@
           <a:p>
             <a:fld id="{0804A3E0-26E0-4A89-A33E-47059F87E0AD}" type="datetimeFigureOut">
               <a:rPr lang="da-DK" smtClean="0"/>
-              <a:t>19-08-2019</a:t>
+              <a:t>23-08-2019</a:t>
             </a:fld>
             <a:endParaRPr lang="da-DK"/>
           </a:p>
@@ -2481,7 +2481,7 @@
     </p:spTree>
     <p:extLst>
       <p:ext uri="{BB962C8B-B14F-4D97-AF65-F5344CB8AC3E}">
-        <p14:creationId xmlns:p14="http://schemas.microsoft.com/office/powerpoint/2010/main" val="1231727499"/>
+        <p14:creationId xmlns:p14="http://schemas.microsoft.com/office/powerpoint/2010/main" val="3216618806"/>
       </p:ext>
     </p:extLst>
   </p:cSld>
@@ -2610,7 +2610,7 @@
           <a:p>
             <a:fld id="{0804A3E0-26E0-4A89-A33E-47059F87E0AD}" type="datetimeFigureOut">
               <a:rPr lang="da-DK" smtClean="0"/>
-              <a:t>19-08-2019</a:t>
+              <a:t>23-08-2019</a:t>
             </a:fld>
             <a:endParaRPr lang="da-DK"/>
           </a:p>
@@ -2743,7 +2743,7 @@
     </p:spTree>
     <p:extLst>
       <p:ext uri="{BB962C8B-B14F-4D97-AF65-F5344CB8AC3E}">
-        <p14:creationId xmlns:p14="http://schemas.microsoft.com/office/powerpoint/2010/main" val="42228037"/>
+        <p14:creationId xmlns:p14="http://schemas.microsoft.com/office/powerpoint/2010/main" val="29829704"/>
       </p:ext>
     </p:extLst>
   </p:cSld>
@@ -2872,7 +2872,7 @@
           <a:p>
             <a:fld id="{0804A3E0-26E0-4A89-A33E-47059F87E0AD}" type="datetimeFigureOut">
               <a:rPr lang="da-DK" smtClean="0"/>
-              <a:t>19-08-2019</a:t>
+              <a:t>23-08-2019</a:t>
             </a:fld>
             <a:endParaRPr lang="da-DK"/>
           </a:p>
@@ -3005,7 +3005,7 @@
     </p:spTree>
     <p:extLst>
       <p:ext uri="{BB962C8B-B14F-4D97-AF65-F5344CB8AC3E}">
-        <p14:creationId xmlns:p14="http://schemas.microsoft.com/office/powerpoint/2010/main" val="3893458376"/>
+        <p14:creationId xmlns:p14="http://schemas.microsoft.com/office/powerpoint/2010/main" val="1490610187"/>
       </p:ext>
     </p:extLst>
   </p:cSld>
@@ -3201,7 +3201,7 @@
           <a:p>
             <a:fld id="{0804A3E0-26E0-4A89-A33E-47059F87E0AD}" type="datetimeFigureOut">
               <a:rPr lang="da-DK" smtClean="0"/>
-              <a:t>19-08-2019</a:t>
+              <a:t>23-08-2019</a:t>
             </a:fld>
             <a:endParaRPr lang="da-DK"/>
           </a:p>
@@ -3339,7 +3339,7 @@
     </p:spTree>
     <p:extLst>
       <p:ext uri="{BB962C8B-B14F-4D97-AF65-F5344CB8AC3E}">
-        <p14:creationId xmlns:p14="http://schemas.microsoft.com/office/powerpoint/2010/main" val="764770526"/>
+        <p14:creationId xmlns:p14="http://schemas.microsoft.com/office/powerpoint/2010/main" val="169201725"/>
       </p:ext>
     </p:extLst>
   </p:cSld>
@@ -3524,7 +3524,7 @@
           <a:p>
             <a:fld id="{0804A3E0-26E0-4A89-A33E-47059F87E0AD}" type="datetimeFigureOut">
               <a:rPr lang="da-DK" smtClean="0"/>
-              <a:t>19-08-2019</a:t>
+              <a:t>23-08-2019</a:t>
             </a:fld>
             <a:endParaRPr lang="da-DK"/>
           </a:p>
@@ -3662,7 +3662,7 @@
     </p:spTree>
     <p:extLst>
       <p:ext uri="{BB962C8B-B14F-4D97-AF65-F5344CB8AC3E}">
-        <p14:creationId xmlns:p14="http://schemas.microsoft.com/office/powerpoint/2010/main" val="131161553"/>
+        <p14:creationId xmlns:p14="http://schemas.microsoft.com/office/powerpoint/2010/main" val="2355510120"/>
       </p:ext>
     </p:extLst>
   </p:cSld>
@@ -3981,7 +3981,7 @@
           <a:p>
             <a:fld id="{0804A3E0-26E0-4A89-A33E-47059F87E0AD}" type="datetimeFigureOut">
               <a:rPr lang="da-DK" smtClean="0"/>
-              <a:t>19-08-2019</a:t>
+              <a:t>23-08-2019</a:t>
             </a:fld>
             <a:endParaRPr lang="da-DK"/>
           </a:p>
@@ -4119,7 +4119,7 @@
     </p:spTree>
     <p:extLst>
       <p:ext uri="{BB962C8B-B14F-4D97-AF65-F5344CB8AC3E}">
-        <p14:creationId xmlns:p14="http://schemas.microsoft.com/office/powerpoint/2010/main" val="787387031"/>
+        <p14:creationId xmlns:p14="http://schemas.microsoft.com/office/powerpoint/2010/main" val="2647925874"/>
       </p:ext>
     </p:extLst>
   </p:cSld>
@@ -4186,7 +4186,7 @@
           <a:p>
             <a:fld id="{0804A3E0-26E0-4A89-A33E-47059F87E0AD}" type="datetimeFigureOut">
               <a:rPr lang="da-DK" smtClean="0"/>
-              <a:t>19-08-2019</a:t>
+              <a:t>23-08-2019</a:t>
             </a:fld>
             <a:endParaRPr lang="da-DK"/>
           </a:p>
@@ -4319,7 +4319,7 @@
     </p:spTree>
     <p:extLst>
       <p:ext uri="{BB962C8B-B14F-4D97-AF65-F5344CB8AC3E}">
-        <p14:creationId xmlns:p14="http://schemas.microsoft.com/office/powerpoint/2010/main" val="1543603279"/>
+        <p14:creationId xmlns:p14="http://schemas.microsoft.com/office/powerpoint/2010/main" val="4018644596"/>
       </p:ext>
     </p:extLst>
   </p:cSld>
@@ -4363,7 +4363,7 @@
           <a:p>
             <a:fld id="{0804A3E0-26E0-4A89-A33E-47059F87E0AD}" type="datetimeFigureOut">
               <a:rPr lang="da-DK" smtClean="0"/>
-              <a:t>19-08-2019</a:t>
+              <a:t>23-08-2019</a:t>
             </a:fld>
             <a:endParaRPr lang="da-DK"/>
           </a:p>
@@ -4496,7 +4496,7 @@
     </p:spTree>
     <p:extLst>
       <p:ext uri="{BB962C8B-B14F-4D97-AF65-F5344CB8AC3E}">
-        <p14:creationId xmlns:p14="http://schemas.microsoft.com/office/powerpoint/2010/main" val="3152910753"/>
+        <p14:creationId xmlns:p14="http://schemas.microsoft.com/office/powerpoint/2010/main" val="3559609126"/>
       </p:ext>
     </p:extLst>
   </p:cSld>
@@ -4696,7 +4696,7 @@
           <a:p>
             <a:fld id="{0804A3E0-26E0-4A89-A33E-47059F87E0AD}" type="datetimeFigureOut">
               <a:rPr lang="da-DK" smtClean="0"/>
-              <a:t>19-08-2019</a:t>
+              <a:t>23-08-2019</a:t>
             </a:fld>
             <a:endParaRPr lang="da-DK"/>
           </a:p>
@@ -4829,7 +4829,7 @@
     </p:spTree>
     <p:extLst>
       <p:ext uri="{BB962C8B-B14F-4D97-AF65-F5344CB8AC3E}">
-        <p14:creationId xmlns:p14="http://schemas.microsoft.com/office/powerpoint/2010/main" val="3569722975"/>
+        <p14:creationId xmlns:p14="http://schemas.microsoft.com/office/powerpoint/2010/main" val="4020398145"/>
       </p:ext>
     </p:extLst>
   </p:cSld>
@@ -5041,7 +5041,7 @@
           <a:p>
             <a:fld id="{0804A3E0-26E0-4A89-A33E-47059F87E0AD}" type="datetimeFigureOut">
               <a:rPr lang="da-DK" smtClean="0"/>
-              <a:t>19-08-2019</a:t>
+              <a:t>23-08-2019</a:t>
             </a:fld>
             <a:endParaRPr lang="da-DK"/>
           </a:p>
@@ -5179,7 +5179,7 @@
     </p:spTree>
     <p:extLst>
       <p:ext uri="{BB962C8B-B14F-4D97-AF65-F5344CB8AC3E}">
-        <p14:creationId xmlns:p14="http://schemas.microsoft.com/office/powerpoint/2010/main" val="3593789907"/>
+        <p14:creationId xmlns:p14="http://schemas.microsoft.com/office/powerpoint/2010/main" val="4054434277"/>
       </p:ext>
     </p:extLst>
   </p:cSld>
@@ -7158,7 +7158,7 @@
           <a:p>
             <a:fld id="{0804A3E0-26E0-4A89-A33E-47059F87E0AD}" type="datetimeFigureOut">
               <a:rPr lang="da-DK" smtClean="0"/>
-              <a:t>19-08-2019</a:t>
+              <a:t>23-08-2019</a:t>
             </a:fld>
             <a:endParaRPr lang="da-DK"/>
           </a:p>
@@ -7243,28 +7243,28 @@
     </p:spTree>
     <p:extLst>
       <p:ext uri="{BB962C8B-B14F-4D97-AF65-F5344CB8AC3E}">
-        <p14:creationId xmlns:p14="http://schemas.microsoft.com/office/powerpoint/2010/main" val="3135388171"/>
+        <p14:creationId xmlns:p14="http://schemas.microsoft.com/office/powerpoint/2010/main" val="1291377138"/>
       </p:ext>
     </p:extLst>
   </p:cSld>
   <p:clrMap bg1="lt1" tx1="dk1" bg2="lt2" tx2="dk2" accent1="accent1" accent2="accent2" accent3="accent3" accent4="accent4" accent5="accent5" accent6="accent6" hlink="hlink" folHlink="folHlink"/>
   <p:sldLayoutIdLst>
-    <p:sldLayoutId id="2147483661" r:id="rId1"/>
-    <p:sldLayoutId id="2147483662" r:id="rId2"/>
-    <p:sldLayoutId id="2147483663" r:id="rId3"/>
-    <p:sldLayoutId id="2147483664" r:id="rId4"/>
-    <p:sldLayoutId id="2147483665" r:id="rId5"/>
-    <p:sldLayoutId id="2147483666" r:id="rId6"/>
-    <p:sldLayoutId id="2147483667" r:id="rId7"/>
-    <p:sldLayoutId id="2147483668" r:id="rId8"/>
-    <p:sldLayoutId id="2147483669" r:id="rId9"/>
-    <p:sldLayoutId id="2147483670" r:id="rId10"/>
-    <p:sldLayoutId id="2147483671" r:id="rId11"/>
-    <p:sldLayoutId id="2147483672" r:id="rId12"/>
-    <p:sldLayoutId id="2147483673" r:id="rId13"/>
-    <p:sldLayoutId id="2147483674" r:id="rId14"/>
-    <p:sldLayoutId id="2147483675" r:id="rId15"/>
-    <p:sldLayoutId id="2147483676" r:id="rId16"/>
+    <p:sldLayoutId id="2147483719" r:id="rId1"/>
+    <p:sldLayoutId id="2147483720" r:id="rId2"/>
+    <p:sldLayoutId id="2147483721" r:id="rId3"/>
+    <p:sldLayoutId id="2147483722" r:id="rId4"/>
+    <p:sldLayoutId id="2147483723" r:id="rId5"/>
+    <p:sldLayoutId id="2147483724" r:id="rId6"/>
+    <p:sldLayoutId id="2147483725" r:id="rId7"/>
+    <p:sldLayoutId id="2147483726" r:id="rId8"/>
+    <p:sldLayoutId id="2147483727" r:id="rId9"/>
+    <p:sldLayoutId id="2147483728" r:id="rId10"/>
+    <p:sldLayoutId id="2147483729" r:id="rId11"/>
+    <p:sldLayoutId id="2147483730" r:id="rId12"/>
+    <p:sldLayoutId id="2147483731" r:id="rId13"/>
+    <p:sldLayoutId id="2147483732" r:id="rId14"/>
+    <p:sldLayoutId id="2147483733" r:id="rId15"/>
+    <p:sldLayoutId id="2147483734" r:id="rId16"/>
   </p:sldLayoutIdLst>
   <p:txStyles>
     <p:titleStyle>
@@ -7678,18 +7678,26 @@
       </p:grpSpPr>
       <p:sp>
         <p:nvSpPr>
-          <p:cNvPr id="4" name="Rectangle 3"/>
+          <p:cNvPr id="95" name="Rectangle 94"/>
           <p:cNvSpPr/>
           <p:nvPr/>
         </p:nvSpPr>
         <p:spPr>
           <a:xfrm>
-            <a:off x="-8345" y="1882896"/>
-            <a:ext cx="2719720" cy="463988"/>
+            <a:off x="5248244" y="573765"/>
+            <a:ext cx="7004783" cy="5119561"/>
           </a:xfrm>
           <a:prstGeom prst="rect">
             <a:avLst/>
           </a:prstGeom>
+          <a:solidFill>
+            <a:schemeClr val="bg1">
+              <a:lumMod val="65000"/>
+            </a:schemeClr>
+          </a:solidFill>
+          <a:ln>
+            <a:noFill/>
+          </a:ln>
         </p:spPr>
         <p:style>
           <a:lnRef idx="2">
@@ -7712,28 +7720,32 @@
           <a:lstStyle/>
           <a:p>
             <a:pPr algn="ctr"/>
-            <a:r>
-              <a:rPr lang="da-DK" sz="1400" dirty="0" err="1" smtClean="0"/>
-              <a:t>ObtainRasterDistanceToCoast.R</a:t>
-            </a:r>
-            <a:endParaRPr lang="da-DK" sz="1400" dirty="0"/>
-          </a:p>
-        </p:txBody>
-      </p:sp>
-      <p:sp>
-        <p:nvSpPr>
-          <p:cNvPr id="5" name="Rectangle 4"/>
+            <a:endParaRPr lang="da-DK" dirty="0"/>
+          </a:p>
+        </p:txBody>
+      </p:sp>
+      <p:sp>
+        <p:nvSpPr>
+          <p:cNvPr id="93" name="Rectangle 92"/>
           <p:cNvSpPr/>
           <p:nvPr/>
         </p:nvSpPr>
         <p:spPr>
           <a:xfrm>
-            <a:off x="-29685" y="3107171"/>
-            <a:ext cx="2741060" cy="566988"/>
+            <a:off x="-152245" y="1458245"/>
+            <a:ext cx="5582066" cy="4521318"/>
           </a:xfrm>
           <a:prstGeom prst="rect">
             <a:avLst/>
           </a:prstGeom>
+          <a:solidFill>
+            <a:schemeClr val="bg1">
+              <a:lumMod val="85000"/>
+            </a:schemeClr>
+          </a:solidFill>
+          <a:ln>
+            <a:noFill/>
+          </a:ln>
         </p:spPr>
         <p:style>
           <a:lnRef idx="2">
@@ -7756,28 +7768,32 @@
           <a:lstStyle/>
           <a:p>
             <a:pPr algn="ctr"/>
-            <a:r>
-              <a:rPr lang="da-DK" sz="1400" dirty="0" err="1" smtClean="0"/>
-              <a:t>ObtainRasterFleetSpatialDependencies.R</a:t>
-            </a:r>
             <a:endParaRPr lang="da-DK" dirty="0"/>
           </a:p>
         </p:txBody>
       </p:sp>
       <p:sp>
         <p:nvSpPr>
-          <p:cNvPr id="6" name="Oval 5"/>
+          <p:cNvPr id="2" name="Rectangle 1"/>
           <p:cNvSpPr/>
           <p:nvPr/>
         </p:nvSpPr>
         <p:spPr>
           <a:xfrm>
-            <a:off x="3329232" y="1240862"/>
-            <a:ext cx="1815354" cy="968188"/>
-          </a:xfrm>
-          <a:prstGeom prst="ellipse">
+            <a:off x="-2221673" y="670809"/>
+            <a:ext cx="5006181" cy="4673050"/>
+          </a:xfrm>
+          <a:prstGeom prst="rect">
             <a:avLst/>
           </a:prstGeom>
+          <a:solidFill>
+            <a:schemeClr val="bg1">
+              <a:lumMod val="75000"/>
+            </a:schemeClr>
+          </a:solidFill>
+          <a:ln>
+            <a:noFill/>
+          </a:ln>
         </p:spPr>
         <p:style>
           <a:lnRef idx="2">
@@ -7800,26 +7816,22 @@
           <a:lstStyle/>
           <a:p>
             <a:pPr algn="ctr"/>
-            <a:r>
-              <a:rPr lang="da-DK" sz="1400" dirty="0" smtClean="0"/>
-              <a:t>Raster dist2Coast</a:t>
-            </a:r>
-            <a:endParaRPr lang="da-DK" sz="1400" dirty="0"/>
-          </a:p>
-        </p:txBody>
-      </p:sp>
-      <p:sp>
-        <p:nvSpPr>
-          <p:cNvPr id="7" name="Oval 6"/>
+            <a:endParaRPr lang="da-DK" dirty="0"/>
+          </a:p>
+        </p:txBody>
+      </p:sp>
+      <p:sp>
+        <p:nvSpPr>
+          <p:cNvPr id="41" name="Rectangle 40"/>
           <p:cNvSpPr/>
           <p:nvPr/>
         </p:nvSpPr>
         <p:spPr>
           <a:xfrm>
-            <a:off x="3335582" y="3362664"/>
-            <a:ext cx="1815354" cy="968188"/>
-          </a:xfrm>
-          <a:prstGeom prst="ellipse">
+            <a:off x="-8345" y="1882896"/>
+            <a:ext cx="2719720" cy="463988"/>
+          </a:xfrm>
+          <a:prstGeom prst="rect">
             <a:avLst/>
           </a:prstGeom>
         </p:spPr>
@@ -7845,12 +7857,8 @@
           <a:p>
             <a:pPr algn="ctr"/>
             <a:r>
-              <a:rPr lang="da-DK" sz="1400" dirty="0" smtClean="0"/>
-              <a:t>Raster </a:t>
-            </a:r>
-            <a:r>
               <a:rPr lang="da-DK" sz="1400" dirty="0" err="1" smtClean="0"/>
-              <a:t>SpatialDepend</a:t>
+              <a:t>ObtainRasterDistanceToCoast.R</a:t>
             </a:r>
             <a:endParaRPr lang="da-DK" sz="1400" dirty="0"/>
           </a:p>
@@ -7858,16 +7866,16 @@
       </p:sp>
       <p:sp>
         <p:nvSpPr>
-          <p:cNvPr id="8" name="Oval 7"/>
+          <p:cNvPr id="42" name="Rectangle 41"/>
           <p:cNvSpPr/>
           <p:nvPr/>
         </p:nvSpPr>
         <p:spPr>
           <a:xfrm>
-            <a:off x="-2072976" y="3341147"/>
-            <a:ext cx="1602242" cy="755514"/>
-          </a:xfrm>
-          <a:prstGeom prst="ellipse">
+            <a:off x="-29685" y="3107171"/>
+            <a:ext cx="2741060" cy="566988"/>
+          </a:xfrm>
+          <a:prstGeom prst="rect">
             <a:avLst/>
           </a:prstGeom>
         </p:spPr>
@@ -7893,45 +7901,37 @@
           <a:p>
             <a:pPr algn="ctr"/>
             <a:r>
-              <a:rPr lang="da-DK" sz="1600" dirty="0" err="1" smtClean="0"/>
-              <a:t>Logbooks</a:t>
-            </a:r>
-            <a:endParaRPr lang="da-DK" sz="1600" dirty="0" smtClean="0"/>
-          </a:p>
-          <a:p>
-            <a:pPr algn="ctr"/>
-            <a:r>
-              <a:rPr lang="da-DK" sz="1600" dirty="0" smtClean="0"/>
-              <a:t>Or </a:t>
-            </a:r>
-            <a:r>
-              <a:rPr lang="da-DK" sz="1200" dirty="0" smtClean="0"/>
-              <a:t>SECFISH</a:t>
-            </a:r>
-            <a:r>
-              <a:rPr lang="da-DK" sz="1600" dirty="0" smtClean="0"/>
+              <a:rPr lang="da-DK" sz="1400" dirty="0" err="1" smtClean="0"/>
+              <a:t>ObtainRasterFleetSpatialDependencies.R</a:t>
+            </a:r>
+            <a:r>
+              <a:rPr lang="da-DK" sz="1400" dirty="0" smtClean="0"/>
               <a:t> </a:t>
             </a:r>
             <a:r>
-              <a:rPr lang="da-DK" sz="1600" dirty="0" err="1" smtClean="0"/>
-              <a:t>routines</a:t>
-            </a:r>
-            <a:endParaRPr lang="da-DK" sz="1600" dirty="0"/>
-          </a:p>
-        </p:txBody>
-      </p:sp>
-      <p:sp>
-        <p:nvSpPr>
-          <p:cNvPr id="9" name="Rectangle 8"/>
+              <a:rPr lang="da-DK" sz="1400" dirty="0" err="1" smtClean="0"/>
+              <a:t>e.g</a:t>
+            </a:r>
+            <a:r>
+              <a:rPr lang="da-DK" sz="1400" dirty="0" smtClean="0"/>
+              <a:t>. ISLA</a:t>
+            </a:r>
+            <a:endParaRPr lang="da-DK" dirty="0"/>
+          </a:p>
+        </p:txBody>
+      </p:sp>
+      <p:sp>
+        <p:nvSpPr>
+          <p:cNvPr id="43" name="Oval 42"/>
           <p:cNvSpPr/>
           <p:nvPr/>
         </p:nvSpPr>
         <p:spPr>
           <a:xfrm>
-            <a:off x="-52609" y="3804199"/>
-            <a:ext cx="2763983" cy="584924"/>
-          </a:xfrm>
-          <a:prstGeom prst="rect">
+            <a:off x="3329232" y="1240862"/>
+            <a:ext cx="1815354" cy="968188"/>
+          </a:xfrm>
+          <a:prstGeom prst="ellipse">
             <a:avLst/>
           </a:prstGeom>
         </p:spPr>
@@ -7957,25 +7957,25 @@
           <a:p>
             <a:pPr algn="ctr"/>
             <a:r>
-              <a:rPr lang="da-DK" sz="1400" dirty="0" err="1" smtClean="0"/>
-              <a:t>ObtainRasterGVADisagregated.R</a:t>
-            </a:r>
-            <a:endParaRPr lang="da-DK" dirty="0"/>
-          </a:p>
-        </p:txBody>
-      </p:sp>
-      <p:sp>
-        <p:nvSpPr>
-          <p:cNvPr id="10" name="Rectangle 9"/>
+              <a:rPr lang="da-DK" sz="1400" dirty="0" smtClean="0"/>
+              <a:t>Raster dist2Coast</a:t>
+            </a:r>
+            <a:endParaRPr lang="da-DK" sz="1400" dirty="0"/>
+          </a:p>
+        </p:txBody>
+      </p:sp>
+      <p:sp>
+        <p:nvSpPr>
+          <p:cNvPr id="44" name="Oval 43"/>
           <p:cNvSpPr/>
           <p:nvPr/>
         </p:nvSpPr>
         <p:spPr>
           <a:xfrm>
-            <a:off x="-21230" y="2512129"/>
-            <a:ext cx="2732605" cy="448242"/>
-          </a:xfrm>
-          <a:prstGeom prst="rect">
+            <a:off x="3335582" y="3362664"/>
+            <a:ext cx="1815354" cy="968188"/>
+          </a:xfrm>
+          <a:prstGeom prst="ellipse">
             <a:avLst/>
           </a:prstGeom>
         </p:spPr>
@@ -8001,8 +8001,12 @@
           <a:p>
             <a:pPr algn="ctr"/>
             <a:r>
+              <a:rPr lang="da-DK" sz="1400" dirty="0" smtClean="0"/>
+              <a:t>Raster </a:t>
+            </a:r>
+            <a:r>
               <a:rPr lang="da-DK" sz="1400" dirty="0" err="1" smtClean="0"/>
-              <a:t>ObtainRasterJRCOceanProd.R</a:t>
+              <a:t>SpatialDepend</a:t>
             </a:r>
             <a:endParaRPr lang="da-DK" sz="1400" dirty="0"/>
           </a:p>
@@ -8010,14 +8014,14 @@
       </p:sp>
       <p:sp>
         <p:nvSpPr>
-          <p:cNvPr id="11" name="Oval 10"/>
+          <p:cNvPr id="45" name="Oval 44"/>
           <p:cNvSpPr/>
           <p:nvPr/>
         </p:nvSpPr>
         <p:spPr>
           <a:xfrm>
-            <a:off x="3335582" y="2334001"/>
-            <a:ext cx="1815354" cy="968188"/>
+            <a:off x="-2072976" y="3341147"/>
+            <a:ext cx="1602242" cy="755514"/>
           </a:xfrm>
           <a:prstGeom prst="ellipse">
             <a:avLst/>
@@ -8045,25 +8049,45 @@
           <a:p>
             <a:pPr algn="ctr"/>
             <a:r>
-              <a:rPr lang="da-DK" sz="1400" dirty="0" smtClean="0"/>
-              <a:t>Raster OP/LPUE</a:t>
-            </a:r>
-            <a:endParaRPr lang="da-DK" sz="1400" dirty="0"/>
-          </a:p>
-        </p:txBody>
-      </p:sp>
-      <p:sp>
-        <p:nvSpPr>
-          <p:cNvPr id="12" name="Oval 11"/>
+              <a:rPr lang="da-DK" sz="1600" dirty="0" err="1" smtClean="0"/>
+              <a:t>Logbooks</a:t>
+            </a:r>
+            <a:endParaRPr lang="da-DK" sz="1600" dirty="0" smtClean="0"/>
+          </a:p>
+          <a:p>
+            <a:pPr algn="ctr"/>
+            <a:r>
+              <a:rPr lang="da-DK" sz="1600" dirty="0" smtClean="0"/>
+              <a:t>Or </a:t>
+            </a:r>
+            <a:r>
+              <a:rPr lang="da-DK" sz="1200" dirty="0" smtClean="0"/>
+              <a:t>SECFISH</a:t>
+            </a:r>
+            <a:r>
+              <a:rPr lang="da-DK" sz="1600" dirty="0" smtClean="0"/>
+              <a:t> </a:t>
+            </a:r>
+            <a:r>
+              <a:rPr lang="da-DK" sz="1600" dirty="0" err="1" smtClean="0"/>
+              <a:t>routines</a:t>
+            </a:r>
+            <a:endParaRPr lang="da-DK" sz="1600" dirty="0"/>
+          </a:p>
+        </p:txBody>
+      </p:sp>
+      <p:sp>
+        <p:nvSpPr>
+          <p:cNvPr id="46" name="Rectangle 45"/>
           <p:cNvSpPr/>
           <p:nvPr/>
         </p:nvSpPr>
         <p:spPr>
           <a:xfrm>
-            <a:off x="6261064" y="562810"/>
-            <a:ext cx="1815354" cy="968188"/>
-          </a:xfrm>
-          <a:prstGeom prst="ellipse">
+            <a:off x="-52609" y="3804199"/>
+            <a:ext cx="2763983" cy="584924"/>
+          </a:xfrm>
+          <a:prstGeom prst="rect">
             <a:avLst/>
           </a:prstGeom>
         </p:spPr>
@@ -8089,6 +8113,138 @@
           <a:p>
             <a:pPr algn="ctr"/>
             <a:r>
+              <a:rPr lang="da-DK" sz="1400" dirty="0" err="1" smtClean="0"/>
+              <a:t>ObtainRasterGVADisagregated.R</a:t>
+            </a:r>
+            <a:endParaRPr lang="da-DK" dirty="0"/>
+          </a:p>
+        </p:txBody>
+      </p:sp>
+      <p:sp>
+        <p:nvSpPr>
+          <p:cNvPr id="48" name="Rectangle 47"/>
+          <p:cNvSpPr/>
+          <p:nvPr/>
+        </p:nvSpPr>
+        <p:spPr>
+          <a:xfrm>
+            <a:off x="-21230" y="2512129"/>
+            <a:ext cx="2732605" cy="448242"/>
+          </a:xfrm>
+          <a:prstGeom prst="rect">
+            <a:avLst/>
+          </a:prstGeom>
+        </p:spPr>
+        <p:style>
+          <a:lnRef idx="2">
+            <a:schemeClr val="accent1">
+              <a:shade val="50000"/>
+            </a:schemeClr>
+          </a:lnRef>
+          <a:fillRef idx="1">
+            <a:schemeClr val="accent1"/>
+          </a:fillRef>
+          <a:effectRef idx="0">
+            <a:schemeClr val="accent1"/>
+          </a:effectRef>
+          <a:fontRef idx="minor">
+            <a:schemeClr val="lt1"/>
+          </a:fontRef>
+        </p:style>
+        <p:txBody>
+          <a:bodyPr rtlCol="0" anchor="ctr"/>
+          <a:lstStyle/>
+          <a:p>
+            <a:pPr algn="ctr"/>
+            <a:r>
+              <a:rPr lang="da-DK" sz="1400" dirty="0" err="1" smtClean="0"/>
+              <a:t>ObtainRasterJRCOceanProd.R</a:t>
+            </a:r>
+            <a:endParaRPr lang="da-DK" sz="1400" dirty="0"/>
+          </a:p>
+        </p:txBody>
+      </p:sp>
+      <p:sp>
+        <p:nvSpPr>
+          <p:cNvPr id="50" name="Oval 49"/>
+          <p:cNvSpPr/>
+          <p:nvPr/>
+        </p:nvSpPr>
+        <p:spPr>
+          <a:xfrm>
+            <a:off x="3335582" y="2334001"/>
+            <a:ext cx="1815354" cy="968188"/>
+          </a:xfrm>
+          <a:prstGeom prst="ellipse">
+            <a:avLst/>
+          </a:prstGeom>
+        </p:spPr>
+        <p:style>
+          <a:lnRef idx="2">
+            <a:schemeClr val="accent1">
+              <a:shade val="50000"/>
+            </a:schemeClr>
+          </a:lnRef>
+          <a:fillRef idx="1">
+            <a:schemeClr val="accent1"/>
+          </a:fillRef>
+          <a:effectRef idx="0">
+            <a:schemeClr val="accent1"/>
+          </a:effectRef>
+          <a:fontRef idx="minor">
+            <a:schemeClr val="lt1"/>
+          </a:fontRef>
+        </p:style>
+        <p:txBody>
+          <a:bodyPr rtlCol="0" anchor="ctr"/>
+          <a:lstStyle/>
+          <a:p>
+            <a:pPr algn="ctr"/>
+            <a:r>
+              <a:rPr lang="da-DK" sz="1400" dirty="0" smtClean="0"/>
+              <a:t>Raster OP/LPUE</a:t>
+            </a:r>
+            <a:endParaRPr lang="da-DK" sz="1400" dirty="0"/>
+          </a:p>
+        </p:txBody>
+      </p:sp>
+      <p:sp>
+        <p:nvSpPr>
+          <p:cNvPr id="52" name="Oval 51"/>
+          <p:cNvSpPr/>
+          <p:nvPr/>
+        </p:nvSpPr>
+        <p:spPr>
+          <a:xfrm>
+            <a:off x="6261064" y="562810"/>
+            <a:ext cx="1815354" cy="968188"/>
+          </a:xfrm>
+          <a:prstGeom prst="ellipse">
+            <a:avLst/>
+          </a:prstGeom>
+        </p:spPr>
+        <p:style>
+          <a:lnRef idx="2">
+            <a:schemeClr val="accent1">
+              <a:shade val="50000"/>
+            </a:schemeClr>
+          </a:lnRef>
+          <a:fillRef idx="1">
+            <a:schemeClr val="accent1"/>
+          </a:fillRef>
+          <a:effectRef idx="0">
+            <a:schemeClr val="accent1"/>
+          </a:effectRef>
+          <a:fontRef idx="minor">
+            <a:schemeClr val="lt1"/>
+          </a:fontRef>
+        </p:style>
+        <p:txBody>
+          <a:bodyPr rtlCol="0" anchor="ctr"/>
+          <a:lstStyle/>
+          <a:p>
+            <a:pPr algn="ctr"/>
+            <a:r>
               <a:rPr lang="da-DK" sz="1400" dirty="0" smtClean="0"/>
               <a:t>WGSFD </a:t>
             </a:r>
@@ -8106,10 +8262,10 @@
       </p:sp>
       <p:cxnSp>
         <p:nvCxnSpPr>
-          <p:cNvPr id="23" name="Elbow Connector 22"/>
+          <p:cNvPr id="55" name="Elbow Connector 54"/>
           <p:cNvCxnSpPr>
-            <a:stCxn id="8" idx="6"/>
-            <a:endCxn id="5" idx="1"/>
+            <a:stCxn id="45" idx="6"/>
+            <a:endCxn id="42" idx="1"/>
           </p:cNvCxnSpPr>
           <p:nvPr/>
         </p:nvCxnSpPr>
@@ -8144,10 +8300,10 @@
       </p:cxnSp>
       <p:cxnSp>
         <p:nvCxnSpPr>
-          <p:cNvPr id="25" name="Elbow Connector 24"/>
+          <p:cNvPr id="56" name="Elbow Connector 55"/>
           <p:cNvCxnSpPr>
-            <a:stCxn id="8" idx="6"/>
-            <a:endCxn id="9" idx="1"/>
+            <a:stCxn id="45" idx="6"/>
+            <a:endCxn id="46" idx="1"/>
           </p:cNvCxnSpPr>
           <p:nvPr/>
         </p:nvCxnSpPr>
@@ -8182,10 +8338,10 @@
       </p:cxnSp>
       <p:cxnSp>
         <p:nvCxnSpPr>
-          <p:cNvPr id="27" name="Elbow Connector 26"/>
+          <p:cNvPr id="58" name="Elbow Connector 57"/>
           <p:cNvCxnSpPr>
-            <a:stCxn id="139" idx="6"/>
-            <a:endCxn id="10" idx="1"/>
+            <a:stCxn id="90" idx="6"/>
+            <a:endCxn id="48" idx="1"/>
           </p:cNvCxnSpPr>
           <p:nvPr/>
         </p:nvCxnSpPr>
@@ -8218,10 +8374,10 @@
       </p:cxnSp>
       <p:cxnSp>
         <p:nvCxnSpPr>
-          <p:cNvPr id="31" name="Elbow Connector 30"/>
+          <p:cNvPr id="60" name="Elbow Connector 59"/>
           <p:cNvCxnSpPr>
-            <a:stCxn id="4" idx="3"/>
-            <a:endCxn id="6" idx="2"/>
+            <a:stCxn id="41" idx="3"/>
+            <a:endCxn id="43" idx="2"/>
           </p:cNvCxnSpPr>
           <p:nvPr/>
         </p:nvCxnSpPr>
@@ -8254,10 +8410,10 @@
       </p:cxnSp>
       <p:cxnSp>
         <p:nvCxnSpPr>
-          <p:cNvPr id="33" name="Elbow Connector 32"/>
+          <p:cNvPr id="63" name="Elbow Connector 62"/>
           <p:cNvCxnSpPr>
-            <a:stCxn id="10" idx="3"/>
-            <a:endCxn id="11" idx="2"/>
+            <a:stCxn id="48" idx="3"/>
+            <a:endCxn id="50" idx="2"/>
           </p:cNvCxnSpPr>
           <p:nvPr/>
         </p:nvCxnSpPr>
@@ -8290,10 +8446,10 @@
       </p:cxnSp>
       <p:cxnSp>
         <p:nvCxnSpPr>
-          <p:cNvPr id="35" name="Elbow Connector 34"/>
+          <p:cNvPr id="64" name="Elbow Connector 63"/>
           <p:cNvCxnSpPr>
-            <a:stCxn id="5" idx="3"/>
-            <a:endCxn id="7" idx="2"/>
+            <a:stCxn id="42" idx="3"/>
+            <a:endCxn id="44" idx="2"/>
           </p:cNvCxnSpPr>
           <p:nvPr/>
         </p:nvCxnSpPr>
@@ -8326,7 +8482,7 @@
       </p:cxnSp>
       <p:sp>
         <p:nvSpPr>
-          <p:cNvPr id="36" name="Oval 35"/>
+          <p:cNvPr id="66" name="Oval 65"/>
           <p:cNvSpPr/>
           <p:nvPr/>
         </p:nvSpPr>
@@ -8370,7 +8526,7 @@
       </p:sp>
       <p:sp>
         <p:nvSpPr>
-          <p:cNvPr id="37" name="Rectangle 36"/>
+          <p:cNvPr id="68" name="Rectangle 67"/>
           <p:cNvSpPr/>
           <p:nvPr/>
         </p:nvSpPr>
@@ -8414,7 +8570,7 @@
       </p:sp>
       <p:sp>
         <p:nvSpPr>
-          <p:cNvPr id="38" name="Rectangle 37"/>
+          <p:cNvPr id="69" name="Rectangle 68"/>
           <p:cNvSpPr/>
           <p:nvPr/>
         </p:nvSpPr>
@@ -8458,7 +8614,7 @@
       </p:sp>
       <p:sp>
         <p:nvSpPr>
-          <p:cNvPr id="39" name="Rectangle 38"/>
+          <p:cNvPr id="70" name="Rectangle 69"/>
           <p:cNvSpPr/>
           <p:nvPr/>
         </p:nvSpPr>
@@ -8502,10 +8658,10 @@
       </p:sp>
       <p:cxnSp>
         <p:nvCxnSpPr>
-          <p:cNvPr id="47" name="Elbow Connector 46"/>
+          <p:cNvPr id="71" name="Elbow Connector 70"/>
           <p:cNvCxnSpPr>
-            <a:stCxn id="39" idx="2"/>
-            <a:endCxn id="37" idx="0"/>
+            <a:stCxn id="70" idx="2"/>
+            <a:endCxn id="68" idx="0"/>
           </p:cNvCxnSpPr>
           <p:nvPr/>
         </p:nvCxnSpPr>
@@ -8540,10 +8696,10 @@
       </p:cxnSp>
       <p:cxnSp>
         <p:nvCxnSpPr>
-          <p:cNvPr id="49" name="Elbow Connector 48"/>
+          <p:cNvPr id="72" name="Elbow Connector 71"/>
           <p:cNvCxnSpPr>
-            <a:stCxn id="12" idx="4"/>
-            <a:endCxn id="39" idx="0"/>
+            <a:stCxn id="52" idx="4"/>
+            <a:endCxn id="70" idx="0"/>
           </p:cNvCxnSpPr>
           <p:nvPr/>
         </p:nvCxnSpPr>
@@ -8576,17 +8732,17 @@
       </p:cxnSp>
       <p:cxnSp>
         <p:nvCxnSpPr>
-          <p:cNvPr id="51" name="Elbow Connector 50"/>
+          <p:cNvPr id="74" name="Elbow Connector 73"/>
           <p:cNvCxnSpPr>
-            <a:stCxn id="37" idx="3"/>
-            <a:endCxn id="62" idx="0"/>
+            <a:stCxn id="68" idx="3"/>
+            <a:endCxn id="81" idx="0"/>
           </p:cNvCxnSpPr>
           <p:nvPr/>
         </p:nvCxnSpPr>
         <p:spPr>
           <a:xfrm>
             <a:off x="8890183" y="3515275"/>
-            <a:ext cx="239015" cy="2072279"/>
+            <a:ext cx="287206" cy="2127001"/>
           </a:xfrm>
           <a:prstGeom prst="bentConnector2">
             <a:avLst/>
@@ -8612,10 +8768,10 @@
       </p:cxnSp>
       <p:cxnSp>
         <p:nvCxnSpPr>
-          <p:cNvPr id="53" name="Elbow Connector 52"/>
+          <p:cNvPr id="75" name="Elbow Connector 74"/>
           <p:cNvCxnSpPr>
-            <a:stCxn id="37" idx="2"/>
-            <a:endCxn id="38" idx="0"/>
+            <a:stCxn id="68" idx="2"/>
+            <a:endCxn id="69" idx="0"/>
           </p:cNvCxnSpPr>
           <p:nvPr/>
         </p:nvCxnSpPr>
@@ -8648,7 +8804,7 @@
       </p:cxnSp>
       <p:sp>
         <p:nvSpPr>
-          <p:cNvPr id="54" name="Rectangle 53"/>
+          <p:cNvPr id="77" name="Rectangle 76"/>
           <p:cNvSpPr/>
           <p:nvPr/>
         </p:nvSpPr>
@@ -8692,7 +8848,7 @@
       </p:sp>
       <p:sp>
         <p:nvSpPr>
-          <p:cNvPr id="57" name="Rectangle 56"/>
+          <p:cNvPr id="78" name="Rectangle 77"/>
           <p:cNvSpPr/>
           <p:nvPr/>
         </p:nvSpPr>
@@ -8736,7 +8892,11 @@
             </a:r>
             <a:r>
               <a:rPr lang="da-DK" sz="1400" dirty="0" smtClean="0"/>
-              <a:t>. DISPLACE/SMART</a:t>
+              <a:t>. DISPLACE/SMART/</a:t>
+            </a:r>
+            <a:r>
+              <a:rPr lang="da-DK" sz="1400" dirty="0" err="1" smtClean="0"/>
+              <a:t>FishRent</a:t>
             </a:r>
             <a:endParaRPr lang="da-DK" dirty="0"/>
           </a:p>
@@ -8744,10 +8904,10 @@
       </p:sp>
       <p:cxnSp>
         <p:nvCxnSpPr>
-          <p:cNvPr id="59" name="Elbow Connector 58"/>
+          <p:cNvPr id="79" name="Elbow Connector 78"/>
           <p:cNvCxnSpPr>
-            <a:stCxn id="57" idx="2"/>
-            <a:endCxn id="54" idx="0"/>
+            <a:stCxn id="78" idx="2"/>
+            <a:endCxn id="77" idx="0"/>
           </p:cNvCxnSpPr>
           <p:nvPr/>
         </p:nvCxnSpPr>
@@ -8780,51 +8940,15 @@
           </a:fontRef>
         </p:style>
       </p:cxnSp>
-      <p:cxnSp>
-        <p:nvCxnSpPr>
-          <p:cNvPr id="61" name="Elbow Connector 60"/>
-          <p:cNvCxnSpPr>
-            <a:stCxn id="38" idx="2"/>
-            <a:endCxn id="62" idx="1"/>
-          </p:cNvCxnSpPr>
-          <p:nvPr/>
-        </p:nvCxnSpPr>
-        <p:spPr>
-          <a:xfrm rot="16200000" flipH="1">
-            <a:off x="6989740" y="5350855"/>
-            <a:ext cx="861198" cy="472812"/>
-          </a:xfrm>
-          <a:prstGeom prst="bentConnector2">
-            <a:avLst/>
-          </a:prstGeom>
-          <a:ln>
-            <a:tailEnd type="triangle"/>
-          </a:ln>
-        </p:spPr>
-        <p:style>
-          <a:lnRef idx="1">
-            <a:schemeClr val="accent1"/>
-          </a:lnRef>
-          <a:fillRef idx="0">
-            <a:schemeClr val="accent1"/>
-          </a:fillRef>
-          <a:effectRef idx="0">
-            <a:schemeClr val="accent1"/>
-          </a:effectRef>
-          <a:fontRef idx="minor">
-            <a:schemeClr val="tx1"/>
-          </a:fontRef>
-        </p:style>
-      </p:cxnSp>
-      <p:sp>
-        <p:nvSpPr>
-          <p:cNvPr id="62" name="Rectangle 61"/>
+      <p:sp>
+        <p:nvSpPr>
+          <p:cNvPr id="81" name="Rectangle 80"/>
           <p:cNvSpPr/>
           <p:nvPr/>
         </p:nvSpPr>
         <p:spPr>
           <a:xfrm>
-            <a:off x="7656745" y="5587554"/>
+            <a:off x="7704936" y="5642276"/>
             <a:ext cx="2944905" cy="860611"/>
           </a:xfrm>
           <a:prstGeom prst="rect">
@@ -8854,7 +8978,14 @@
             <a:pPr algn="ctr"/>
             <a:r>
               <a:rPr lang="da-DK" sz="1400" dirty="0" smtClean="0"/>
-              <a:t>WGFBIT</a:t>
+              <a:t>WGFBIT </a:t>
+            </a:r>
+          </a:p>
+          <a:p>
+            <a:pPr algn="ctr"/>
+            <a:r>
+              <a:rPr lang="da-DK" sz="1400" dirty="0" smtClean="0"/>
+              <a:t>(or SPATIAL LONG TERM DYNAMICS MODELLING)</a:t>
             </a:r>
             <a:endParaRPr lang="da-DK" sz="1400" dirty="0"/>
           </a:p>
@@ -8862,17 +8993,17 @@
       </p:sp>
       <p:cxnSp>
         <p:nvCxnSpPr>
-          <p:cNvPr id="65" name="Elbow Connector 64"/>
+          <p:cNvPr id="82" name="Elbow Connector 81"/>
           <p:cNvCxnSpPr>
-            <a:stCxn id="54" idx="2"/>
-            <a:endCxn id="62" idx="3"/>
+            <a:stCxn id="77" idx="2"/>
+            <a:endCxn id="81" idx="3"/>
           </p:cNvCxnSpPr>
           <p:nvPr/>
         </p:nvCxnSpPr>
         <p:spPr>
           <a:xfrm rot="5400000">
-            <a:off x="10161414" y="5398699"/>
-            <a:ext cx="1059398" cy="178925"/>
+            <a:off x="10158148" y="5450155"/>
+            <a:ext cx="1114120" cy="130734"/>
           </a:xfrm>
           <a:prstGeom prst="bentConnector2">
             <a:avLst/>
@@ -8898,10 +9029,10 @@
       </p:cxnSp>
       <p:cxnSp>
         <p:nvCxnSpPr>
-          <p:cNvPr id="67" name="Elbow Connector 66"/>
+          <p:cNvPr id="83" name="Elbow Connector 82"/>
           <p:cNvCxnSpPr>
-            <a:stCxn id="12" idx="6"/>
-            <a:endCxn id="57" idx="0"/>
+            <a:stCxn id="52" idx="6"/>
+            <a:endCxn id="78" idx="0"/>
           </p:cNvCxnSpPr>
           <p:nvPr/>
         </p:nvCxnSpPr>
@@ -8934,10 +9065,10 @@
       </p:cxnSp>
       <p:cxnSp>
         <p:nvCxnSpPr>
-          <p:cNvPr id="73" name="Elbow Connector 72"/>
+          <p:cNvPr id="84" name="Elbow Connector 83"/>
           <p:cNvCxnSpPr>
-            <a:stCxn id="9" idx="3"/>
-            <a:endCxn id="36" idx="2"/>
+            <a:stCxn id="46" idx="3"/>
+            <a:endCxn id="66" idx="2"/>
           </p:cNvCxnSpPr>
           <p:nvPr/>
         </p:nvCxnSpPr>
@@ -8970,7 +9101,7 @@
       </p:cxnSp>
       <p:sp>
         <p:nvSpPr>
-          <p:cNvPr id="76" name="Rectangle 75"/>
+          <p:cNvPr id="85" name="Rectangle 84"/>
           <p:cNvSpPr/>
           <p:nvPr/>
         </p:nvSpPr>
@@ -9014,10 +9145,10 @@
       </p:sp>
       <p:cxnSp>
         <p:nvCxnSpPr>
-          <p:cNvPr id="130" name="Elbow Connector 129"/>
+          <p:cNvPr id="86" name="Elbow Connector 85"/>
           <p:cNvCxnSpPr>
-            <a:stCxn id="6" idx="6"/>
-            <a:endCxn id="39" idx="1"/>
+            <a:stCxn id="43" idx="6"/>
+            <a:endCxn id="70" idx="1"/>
           </p:cNvCxnSpPr>
           <p:nvPr/>
         </p:nvCxnSpPr>
@@ -9050,10 +9181,10 @@
       </p:cxnSp>
       <p:cxnSp>
         <p:nvCxnSpPr>
-          <p:cNvPr id="132" name="Elbow Connector 131"/>
+          <p:cNvPr id="87" name="Elbow Connector 86"/>
           <p:cNvCxnSpPr>
-            <a:stCxn id="11" idx="6"/>
-            <a:endCxn id="39" idx="1"/>
+            <a:stCxn id="50" idx="6"/>
+            <a:endCxn id="70" idx="1"/>
           </p:cNvCxnSpPr>
           <p:nvPr/>
         </p:nvCxnSpPr>
@@ -9086,10 +9217,10 @@
       </p:cxnSp>
       <p:cxnSp>
         <p:nvCxnSpPr>
-          <p:cNvPr id="134" name="Elbow Connector 133"/>
+          <p:cNvPr id="88" name="Elbow Connector 87"/>
           <p:cNvCxnSpPr>
-            <a:stCxn id="7" idx="6"/>
-            <a:endCxn id="39" idx="1"/>
+            <a:stCxn id="44" idx="6"/>
+            <a:endCxn id="70" idx="1"/>
           </p:cNvCxnSpPr>
           <p:nvPr/>
         </p:nvCxnSpPr>
@@ -9122,10 +9253,10 @@
       </p:cxnSp>
       <p:cxnSp>
         <p:nvCxnSpPr>
-          <p:cNvPr id="138" name="Elbow Connector 137"/>
+          <p:cNvPr id="89" name="Elbow Connector 88"/>
           <p:cNvCxnSpPr>
-            <a:stCxn id="36" idx="6"/>
-            <a:endCxn id="39" idx="1"/>
+            <a:stCxn id="66" idx="6"/>
+            <a:endCxn id="70" idx="1"/>
           </p:cNvCxnSpPr>
           <p:nvPr/>
         </p:nvCxnSpPr>
@@ -9158,7 +9289,7 @@
       </p:cxnSp>
       <p:sp>
         <p:nvSpPr>
-          <p:cNvPr id="139" name="Oval 138"/>
+          <p:cNvPr id="90" name="Oval 89"/>
           <p:cNvSpPr/>
           <p:nvPr/>
         </p:nvSpPr>
@@ -9202,7 +9333,7 @@
       </p:sp>
       <p:sp>
         <p:nvSpPr>
-          <p:cNvPr id="147" name="Rectangle 146"/>
+          <p:cNvPr id="91" name="Rectangle 90"/>
           <p:cNvSpPr/>
           <p:nvPr/>
         </p:nvSpPr>
@@ -9290,10 +9421,10 @@
       </p:sp>
       <p:cxnSp>
         <p:nvCxnSpPr>
-          <p:cNvPr id="149" name="Elbow Connector 148"/>
+          <p:cNvPr id="92" name="Elbow Connector 91"/>
           <p:cNvCxnSpPr>
-            <a:stCxn id="12" idx="7"/>
-            <a:endCxn id="147" idx="1"/>
+            <a:stCxn id="52" idx="7"/>
+            <a:endCxn id="91" idx="1"/>
           </p:cNvCxnSpPr>
           <p:nvPr/>
         </p:nvCxnSpPr>
@@ -9301,6 +9432,297 @@
           <a:xfrm rot="5400000" flipH="1" flipV="1">
             <a:off x="7937197" y="204695"/>
             <a:ext cx="373272" cy="626534"/>
+          </a:xfrm>
+          <a:prstGeom prst="bentConnector2">
+            <a:avLst/>
+          </a:prstGeom>
+          <a:ln>
+            <a:tailEnd type="triangle"/>
+          </a:ln>
+        </p:spPr>
+        <p:style>
+          <a:lnRef idx="1">
+            <a:schemeClr val="accent1"/>
+          </a:lnRef>
+          <a:fillRef idx="0">
+            <a:schemeClr val="accent1"/>
+          </a:fillRef>
+          <a:effectRef idx="0">
+            <a:schemeClr val="accent1"/>
+          </a:effectRef>
+          <a:fontRef idx="minor">
+            <a:schemeClr val="tx1"/>
+          </a:fontRef>
+        </p:style>
+      </p:cxnSp>
+      <p:sp>
+        <p:nvSpPr>
+          <p:cNvPr id="3" name="TextBox 2"/>
+          <p:cNvSpPr txBox="1"/>
+          <p:nvPr/>
+        </p:nvSpPr>
+        <p:spPr>
+          <a:xfrm>
+            <a:off x="-2221673" y="760674"/>
+            <a:ext cx="3776996" cy="923330"/>
+          </a:xfrm>
+          <a:prstGeom prst="rect">
+            <a:avLst/>
+          </a:prstGeom>
+          <a:noFill/>
+        </p:spPr>
+        <p:txBody>
+          <a:bodyPr wrap="none" rtlCol="0">
+            <a:spAutoFit/>
+          </a:bodyPr>
+          <a:lstStyle/>
+          <a:p>
+            <a:r>
+              <a:rPr lang="da-DK" dirty="0" err="1" smtClean="0"/>
+              <a:t>ToR</a:t>
+            </a:r>
+            <a:r>
+              <a:rPr lang="da-DK" dirty="0" smtClean="0"/>
+              <a:t> (</a:t>
+            </a:r>
+            <a:r>
+              <a:rPr lang="da-DK" dirty="0" err="1" smtClean="0"/>
+              <a:t>a,d</a:t>
+            </a:r>
+            <a:r>
+              <a:rPr lang="da-DK" dirty="0" smtClean="0"/>
+              <a:t>) Practical steps: </a:t>
+            </a:r>
+          </a:p>
+          <a:p>
+            <a:r>
+              <a:rPr lang="da-DK" dirty="0" err="1" smtClean="0"/>
+              <a:t>prioritisation</a:t>
+            </a:r>
+            <a:r>
+              <a:rPr lang="da-DK" dirty="0" smtClean="0"/>
+              <a:t>, data </a:t>
+            </a:r>
+            <a:r>
+              <a:rPr lang="da-DK" dirty="0" err="1" smtClean="0"/>
+              <a:t>availability</a:t>
+            </a:r>
+            <a:r>
+              <a:rPr lang="da-DK" dirty="0" smtClean="0"/>
+              <a:t>,</a:t>
+            </a:r>
+          </a:p>
+          <a:p>
+            <a:r>
+              <a:rPr lang="da-DK" dirty="0" err="1" smtClean="0"/>
+              <a:t>Feasability</a:t>
+            </a:r>
+            <a:r>
+              <a:rPr lang="da-DK" dirty="0" smtClean="0"/>
+              <a:t>, future data </a:t>
+            </a:r>
+            <a:r>
+              <a:rPr lang="da-DK" dirty="0" err="1" smtClean="0"/>
+              <a:t>collation</a:t>
+            </a:r>
+            <a:endParaRPr lang="da-DK" dirty="0"/>
+          </a:p>
+        </p:txBody>
+      </p:sp>
+      <p:sp>
+        <p:nvSpPr>
+          <p:cNvPr id="94" name="TextBox 93"/>
+          <p:cNvSpPr txBox="1"/>
+          <p:nvPr/>
+        </p:nvSpPr>
+        <p:spPr>
+          <a:xfrm>
+            <a:off x="530377" y="5325142"/>
+            <a:ext cx="5052986" cy="646331"/>
+          </a:xfrm>
+          <a:prstGeom prst="rect">
+            <a:avLst/>
+          </a:prstGeom>
+          <a:noFill/>
+        </p:spPr>
+        <p:txBody>
+          <a:bodyPr wrap="none" rtlCol="0">
+            <a:spAutoFit/>
+          </a:bodyPr>
+          <a:lstStyle/>
+          <a:p>
+            <a:r>
+              <a:rPr lang="da-DK" dirty="0" err="1" smtClean="0"/>
+              <a:t>ToR</a:t>
+            </a:r>
+            <a:r>
+              <a:rPr lang="da-DK" dirty="0" smtClean="0"/>
+              <a:t> (b) –Case studies</a:t>
+            </a:r>
+          </a:p>
+          <a:p>
+            <a:r>
+              <a:rPr lang="da-DK" dirty="0" smtClean="0"/>
+              <a:t> for </a:t>
+            </a:r>
+            <a:r>
+              <a:rPr lang="da-DK" dirty="0" err="1" smtClean="0"/>
+              <a:t>disaggregation</a:t>
+            </a:r>
+            <a:r>
+              <a:rPr lang="da-DK" dirty="0" smtClean="0"/>
+              <a:t> to the right </a:t>
+            </a:r>
+            <a:r>
+              <a:rPr lang="da-DK" dirty="0" err="1" smtClean="0"/>
+              <a:t>spatial</a:t>
+            </a:r>
+            <a:r>
+              <a:rPr lang="da-DK" dirty="0" smtClean="0"/>
+              <a:t> </a:t>
+            </a:r>
+            <a:r>
+              <a:rPr lang="da-DK" dirty="0" err="1" smtClean="0"/>
+              <a:t>scale</a:t>
+            </a:r>
+            <a:endParaRPr lang="da-DK" dirty="0"/>
+          </a:p>
+        </p:txBody>
+      </p:sp>
+      <p:sp>
+        <p:nvSpPr>
+          <p:cNvPr id="96" name="TextBox 95"/>
+          <p:cNvSpPr txBox="1"/>
+          <p:nvPr/>
+        </p:nvSpPr>
+        <p:spPr>
+          <a:xfrm>
+            <a:off x="8956357" y="746810"/>
+            <a:ext cx="3857426" cy="1200329"/>
+          </a:xfrm>
+          <a:prstGeom prst="rect">
+            <a:avLst/>
+          </a:prstGeom>
+          <a:noFill/>
+        </p:spPr>
+        <p:txBody>
+          <a:bodyPr wrap="square" rtlCol="0">
+            <a:spAutoFit/>
+          </a:bodyPr>
+          <a:lstStyle/>
+          <a:p>
+            <a:r>
+              <a:rPr lang="da-DK" dirty="0" err="1" smtClean="0"/>
+              <a:t>ToR</a:t>
+            </a:r>
+            <a:r>
+              <a:rPr lang="da-DK" dirty="0" smtClean="0"/>
+              <a:t> (c) – </a:t>
+            </a:r>
+            <a:r>
+              <a:rPr lang="da-DK" dirty="0" err="1" smtClean="0"/>
+              <a:t>Obtain</a:t>
+            </a:r>
+            <a:r>
+              <a:rPr lang="da-DK" dirty="0" smtClean="0"/>
+              <a:t> </a:t>
+            </a:r>
+          </a:p>
+          <a:p>
+            <a:r>
+              <a:rPr lang="da-DK" dirty="0" err="1" smtClean="0"/>
+              <a:t>probability</a:t>
+            </a:r>
+            <a:r>
+              <a:rPr lang="da-DK" dirty="0" smtClean="0"/>
+              <a:t> </a:t>
+            </a:r>
+            <a:r>
+              <a:rPr lang="da-DK" dirty="0" err="1" smtClean="0"/>
+              <a:t>fields</a:t>
+            </a:r>
+            <a:r>
+              <a:rPr lang="da-DK" dirty="0" smtClean="0"/>
+              <a:t> for </a:t>
+            </a:r>
+            <a:r>
+              <a:rPr lang="da-DK" dirty="0" err="1" smtClean="0"/>
+              <a:t>displacement</a:t>
+            </a:r>
+            <a:r>
+              <a:rPr lang="da-DK" dirty="0" smtClean="0"/>
+              <a:t> in </a:t>
+            </a:r>
+            <a:r>
+              <a:rPr lang="da-DK" dirty="0" err="1" smtClean="0"/>
+              <a:t>reaction</a:t>
+            </a:r>
+            <a:r>
+              <a:rPr lang="da-DK" dirty="0" smtClean="0"/>
+              <a:t> to </a:t>
+            </a:r>
+            <a:r>
+              <a:rPr lang="da-DK" dirty="0" err="1" smtClean="0"/>
+              <a:t>effort</a:t>
+            </a:r>
+            <a:r>
+              <a:rPr lang="da-DK" dirty="0" smtClean="0"/>
+              <a:t> cut</a:t>
+            </a:r>
+            <a:endParaRPr lang="da-DK" dirty="0"/>
+          </a:p>
+        </p:txBody>
+      </p:sp>
+      <p:cxnSp>
+        <p:nvCxnSpPr>
+          <p:cNvPr id="98" name="Elbow Connector 97"/>
+          <p:cNvCxnSpPr>
+            <a:stCxn id="91" idx="0"/>
+            <a:endCxn id="52" idx="0"/>
+          </p:cNvCxnSpPr>
+          <p:nvPr/>
+        </p:nvCxnSpPr>
+        <p:spPr>
+          <a:xfrm rot="16200000" flipH="1" flipV="1">
+            <a:off x="8143238" y="-1073477"/>
+            <a:ext cx="661790" cy="2610784"/>
+          </a:xfrm>
+          <a:prstGeom prst="bentConnector3">
+            <a:avLst>
+              <a:gd name="adj1" fmla="val -34543"/>
+            </a:avLst>
+          </a:prstGeom>
+          <a:ln>
+            <a:tailEnd type="triangle"/>
+          </a:ln>
+        </p:spPr>
+        <p:style>
+          <a:lnRef idx="1">
+            <a:schemeClr val="accent1"/>
+          </a:lnRef>
+          <a:fillRef idx="0">
+            <a:schemeClr val="accent1"/>
+          </a:fillRef>
+          <a:effectRef idx="0">
+            <a:schemeClr val="accent1"/>
+          </a:effectRef>
+          <a:fontRef idx="minor">
+            <a:schemeClr val="tx1"/>
+          </a:fontRef>
+        </p:style>
+      </p:cxnSp>
+      <p:cxnSp>
+        <p:nvCxnSpPr>
+          <p:cNvPr id="76" name="Elbow Connector 75"/>
+          <p:cNvCxnSpPr>
+            <a:endCxn id="81" idx="1"/>
+          </p:cNvCxnSpPr>
+          <p:nvPr/>
+        </p:nvCxnSpPr>
+        <p:spPr>
+          <a:xfrm rot="16200000" flipH="1">
+            <a:off x="7012883" y="5380528"/>
+            <a:ext cx="860611" cy="523495"/>
           </a:xfrm>
           <a:prstGeom prst="bentConnector2">
             <a:avLst/>

</xml_diff>

<commit_message>
Restructure the workflow a bit to simplify when accounting for the path from the dynamic approach
</commit_message>
<xml_diff>
--- a/WKTRADE2_R_workflow.pptx
+++ b/WKTRADE2_R_workflow.pptx
@@ -300,7 +300,7 @@
           <a:p>
             <a:fld id="{0804A3E0-26E0-4A89-A33E-47059F87E0AD}" type="datetimeFigureOut">
               <a:rPr lang="da-DK" smtClean="0"/>
-              <a:t>23-08-2019</a:t>
+              <a:t>28-08-2019</a:t>
             </a:fld>
             <a:endParaRPr lang="da-DK"/>
           </a:p>
@@ -638,7 +638,7 @@
           <a:p>
             <a:fld id="{0804A3E0-26E0-4A89-A33E-47059F87E0AD}" type="datetimeFigureOut">
               <a:rPr lang="da-DK" smtClean="0"/>
-              <a:t>23-08-2019</a:t>
+              <a:t>28-08-2019</a:t>
             </a:fld>
             <a:endParaRPr lang="da-DK"/>
           </a:p>
@@ -1039,7 +1039,7 @@
           <a:p>
             <a:fld id="{0804A3E0-26E0-4A89-A33E-47059F87E0AD}" type="datetimeFigureOut">
               <a:rPr lang="da-DK" smtClean="0"/>
-              <a:t>23-08-2019</a:t>
+              <a:t>28-08-2019</a:t>
             </a:fld>
             <a:endParaRPr lang="da-DK"/>
           </a:p>
@@ -1375,7 +1375,7 @@
           <a:p>
             <a:fld id="{0804A3E0-26E0-4A89-A33E-47059F87E0AD}" type="datetimeFigureOut">
               <a:rPr lang="da-DK" smtClean="0"/>
-              <a:t>23-08-2019</a:t>
+              <a:t>28-08-2019</a:t>
             </a:fld>
             <a:endParaRPr lang="da-DK"/>
           </a:p>
@@ -1695,7 +1695,7 @@
           <a:p>
             <a:fld id="{0804A3E0-26E0-4A89-A33E-47059F87E0AD}" type="datetimeFigureOut">
               <a:rPr lang="da-DK" smtClean="0"/>
-              <a:t>23-08-2019</a:t>
+              <a:t>28-08-2019</a:t>
             </a:fld>
             <a:endParaRPr lang="da-DK"/>
           </a:p>
@@ -2091,7 +2091,7 @@
           <a:p>
             <a:fld id="{0804A3E0-26E0-4A89-A33E-47059F87E0AD}" type="datetimeFigureOut">
               <a:rPr lang="da-DK" smtClean="0"/>
-              <a:t>23-08-2019</a:t>
+              <a:t>28-08-2019</a:t>
             </a:fld>
             <a:endParaRPr lang="da-DK"/>
           </a:p>
@@ -2348,7 +2348,7 @@
           <a:p>
             <a:fld id="{0804A3E0-26E0-4A89-A33E-47059F87E0AD}" type="datetimeFigureOut">
               <a:rPr lang="da-DK" smtClean="0"/>
-              <a:t>23-08-2019</a:t>
+              <a:t>28-08-2019</a:t>
             </a:fld>
             <a:endParaRPr lang="da-DK"/>
           </a:p>
@@ -2610,7 +2610,7 @@
           <a:p>
             <a:fld id="{0804A3E0-26E0-4A89-A33E-47059F87E0AD}" type="datetimeFigureOut">
               <a:rPr lang="da-DK" smtClean="0"/>
-              <a:t>23-08-2019</a:t>
+              <a:t>28-08-2019</a:t>
             </a:fld>
             <a:endParaRPr lang="da-DK"/>
           </a:p>
@@ -2872,7 +2872,7 @@
           <a:p>
             <a:fld id="{0804A3E0-26E0-4A89-A33E-47059F87E0AD}" type="datetimeFigureOut">
               <a:rPr lang="da-DK" smtClean="0"/>
-              <a:t>23-08-2019</a:t>
+              <a:t>28-08-2019</a:t>
             </a:fld>
             <a:endParaRPr lang="da-DK"/>
           </a:p>
@@ -3201,7 +3201,7 @@
           <a:p>
             <a:fld id="{0804A3E0-26E0-4A89-A33E-47059F87E0AD}" type="datetimeFigureOut">
               <a:rPr lang="da-DK" smtClean="0"/>
-              <a:t>23-08-2019</a:t>
+              <a:t>28-08-2019</a:t>
             </a:fld>
             <a:endParaRPr lang="da-DK"/>
           </a:p>
@@ -3524,7 +3524,7 @@
           <a:p>
             <a:fld id="{0804A3E0-26E0-4A89-A33E-47059F87E0AD}" type="datetimeFigureOut">
               <a:rPr lang="da-DK" smtClean="0"/>
-              <a:t>23-08-2019</a:t>
+              <a:t>28-08-2019</a:t>
             </a:fld>
             <a:endParaRPr lang="da-DK"/>
           </a:p>
@@ -3981,7 +3981,7 @@
           <a:p>
             <a:fld id="{0804A3E0-26E0-4A89-A33E-47059F87E0AD}" type="datetimeFigureOut">
               <a:rPr lang="da-DK" smtClean="0"/>
-              <a:t>23-08-2019</a:t>
+              <a:t>28-08-2019</a:t>
             </a:fld>
             <a:endParaRPr lang="da-DK"/>
           </a:p>
@@ -4186,7 +4186,7 @@
           <a:p>
             <a:fld id="{0804A3E0-26E0-4A89-A33E-47059F87E0AD}" type="datetimeFigureOut">
               <a:rPr lang="da-DK" smtClean="0"/>
-              <a:t>23-08-2019</a:t>
+              <a:t>28-08-2019</a:t>
             </a:fld>
             <a:endParaRPr lang="da-DK"/>
           </a:p>
@@ -4363,7 +4363,7 @@
           <a:p>
             <a:fld id="{0804A3E0-26E0-4A89-A33E-47059F87E0AD}" type="datetimeFigureOut">
               <a:rPr lang="da-DK" smtClean="0"/>
-              <a:t>23-08-2019</a:t>
+              <a:t>28-08-2019</a:t>
             </a:fld>
             <a:endParaRPr lang="da-DK"/>
           </a:p>
@@ -4696,7 +4696,7 @@
           <a:p>
             <a:fld id="{0804A3E0-26E0-4A89-A33E-47059F87E0AD}" type="datetimeFigureOut">
               <a:rPr lang="da-DK" smtClean="0"/>
-              <a:t>23-08-2019</a:t>
+              <a:t>28-08-2019</a:t>
             </a:fld>
             <a:endParaRPr lang="da-DK"/>
           </a:p>
@@ -5041,7 +5041,7 @@
           <a:p>
             <a:fld id="{0804A3E0-26E0-4A89-A33E-47059F87E0AD}" type="datetimeFigureOut">
               <a:rPr lang="da-DK" smtClean="0"/>
-              <a:t>23-08-2019</a:t>
+              <a:t>28-08-2019</a:t>
             </a:fld>
             <a:endParaRPr lang="da-DK"/>
           </a:p>
@@ -7158,7 +7158,7 @@
           <a:p>
             <a:fld id="{0804A3E0-26E0-4A89-A33E-47059F87E0AD}" type="datetimeFigureOut">
               <a:rPr lang="da-DK" smtClean="0"/>
-              <a:t>23-08-2019</a:t>
+              <a:t>28-08-2019</a:t>
             </a:fld>
             <a:endParaRPr lang="da-DK"/>
           </a:p>
@@ -7684,8 +7684,8 @@
         </p:nvSpPr>
         <p:spPr>
           <a:xfrm>
-            <a:off x="5248244" y="573765"/>
-            <a:ext cx="7004783" cy="5119561"/>
+            <a:off x="-2184802" y="-853874"/>
+            <a:ext cx="14474700" cy="6548349"/>
           </a:xfrm>
           <a:prstGeom prst="rect">
             <a:avLst/>
@@ -8216,7 +8216,7 @@
         </p:nvSpPr>
         <p:spPr>
           <a:xfrm>
-            <a:off x="6261064" y="562810"/>
+            <a:off x="6261064" y="-623412"/>
             <a:ext cx="1815354" cy="968188"/>
           </a:xfrm>
           <a:prstGeom prst="ellipse">
@@ -8532,7 +8532,7 @@
         </p:nvSpPr>
         <p:spPr>
           <a:xfrm>
-            <a:off x="5459998" y="3084969"/>
+            <a:off x="5459891" y="3717675"/>
             <a:ext cx="3430185" cy="860611"/>
           </a:xfrm>
           <a:prstGeom prst="rect">
@@ -8576,8 +8576,8 @@
         </p:nvSpPr>
         <p:spPr>
           <a:xfrm>
-            <a:off x="5462866" y="4296051"/>
-            <a:ext cx="3442133" cy="860611"/>
+            <a:off x="9164003" y="3717675"/>
+            <a:ext cx="3442133" cy="860610"/>
           </a:xfrm>
           <a:prstGeom prst="rect">
             <a:avLst/>
@@ -8606,7 +8606,7 @@
             <a:pPr algn="ctr"/>
             <a:r>
               <a:rPr lang="da-DK" sz="1400" dirty="0" err="1" smtClean="0"/>
-              <a:t>SelectPolygonsToRestrictFromStaticView.R</a:t>
+              <a:t>SelectPolygonsToRestrictFromAugmentedShape.R</a:t>
             </a:r>
             <a:endParaRPr lang="da-DK" sz="1400" dirty="0"/>
           </a:p>
@@ -8667,8 +8667,8 @@
         </p:nvCxnSpPr>
         <p:spPr>
           <a:xfrm rot="5400000">
-            <a:off x="6959736" y="2869614"/>
-            <a:ext cx="430710" cy="12700"/>
+            <a:off x="6643330" y="3185914"/>
+            <a:ext cx="1063416" cy="107"/>
           </a:xfrm>
           <a:prstGeom prst="bentConnector3">
             <a:avLst>
@@ -8705,8 +8705,8 @@
         </p:nvCxnSpPr>
         <p:spPr>
           <a:xfrm rot="16200000" flipH="1">
-            <a:off x="7040591" y="1659148"/>
-            <a:ext cx="262650" cy="6350"/>
+            <a:off x="6447480" y="1066037"/>
+            <a:ext cx="1448872" cy="6350"/>
           </a:xfrm>
           <a:prstGeom prst="bentConnector3">
             <a:avLst/>
@@ -8734,15 +8734,15 @@
         <p:nvCxnSpPr>
           <p:cNvPr id="74" name="Elbow Connector 73"/>
           <p:cNvCxnSpPr>
-            <a:stCxn id="68" idx="3"/>
-            <a:endCxn id="81" idx="0"/>
+            <a:stCxn id="69" idx="2"/>
+            <a:endCxn id="81" idx="3"/>
           </p:cNvCxnSpPr>
           <p:nvPr/>
         </p:nvCxnSpPr>
         <p:spPr>
-          <a:xfrm>
-            <a:off x="8890183" y="3515275"/>
-            <a:ext cx="287206" cy="2127001"/>
+          <a:xfrm rot="5400000">
+            <a:off x="10283165" y="4768150"/>
+            <a:ext cx="791770" cy="412041"/>
           </a:xfrm>
           <a:prstGeom prst="bentConnector2">
             <a:avLst/>
@@ -8770,151 +8770,15 @@
         <p:nvCxnSpPr>
           <p:cNvPr id="75" name="Elbow Connector 74"/>
           <p:cNvCxnSpPr>
-            <a:stCxn id="68" idx="2"/>
-            <a:endCxn id="69" idx="0"/>
+            <a:stCxn id="68" idx="3"/>
+            <a:endCxn id="69" idx="1"/>
           </p:cNvCxnSpPr>
           <p:nvPr/>
         </p:nvCxnSpPr>
         <p:spPr>
-          <a:xfrm rot="16200000" flipH="1">
-            <a:off x="7004277" y="4116394"/>
-            <a:ext cx="350471" cy="8842"/>
-          </a:xfrm>
-          <a:prstGeom prst="bentConnector3">
-            <a:avLst/>
-          </a:prstGeom>
-          <a:ln>
-            <a:tailEnd type="triangle"/>
-          </a:ln>
-        </p:spPr>
-        <p:style>
-          <a:lnRef idx="1">
-            <a:schemeClr val="accent1"/>
-          </a:lnRef>
-          <a:fillRef idx="0">
-            <a:schemeClr val="accent1"/>
-          </a:fillRef>
-          <a:effectRef idx="0">
-            <a:schemeClr val="accent1"/>
-          </a:effectRef>
-          <a:fontRef idx="minor">
-            <a:schemeClr val="tx1"/>
-          </a:fontRef>
-        </p:style>
-      </p:cxnSp>
-      <p:sp>
-        <p:nvSpPr>
-          <p:cNvPr id="77" name="Rectangle 76"/>
-          <p:cNvSpPr/>
-          <p:nvPr/>
-        </p:nvSpPr>
-        <p:spPr>
-          <a:xfrm>
-            <a:off x="9308122" y="4097851"/>
-            <a:ext cx="2944905" cy="860611"/>
-          </a:xfrm>
-          <a:prstGeom prst="rect">
-            <a:avLst/>
-          </a:prstGeom>
-        </p:spPr>
-        <p:style>
-          <a:lnRef idx="2">
-            <a:schemeClr val="accent1">
-              <a:shade val="50000"/>
-            </a:schemeClr>
-          </a:lnRef>
-          <a:fillRef idx="1">
-            <a:schemeClr val="accent1"/>
-          </a:fillRef>
-          <a:effectRef idx="0">
-            <a:schemeClr val="accent1"/>
-          </a:effectRef>
-          <a:fontRef idx="minor">
-            <a:schemeClr val="lt1"/>
-          </a:fontRef>
-        </p:style>
-        <p:txBody>
-          <a:bodyPr rtlCol="0" anchor="ctr"/>
-          <a:lstStyle/>
-          <a:p>
-            <a:pPr algn="ctr"/>
-            <a:r>
-              <a:rPr lang="da-DK" sz="1400" dirty="0" err="1" smtClean="0"/>
-              <a:t>SelectPolygonsToRestrictFromDynamicView.R</a:t>
-            </a:r>
-            <a:endParaRPr lang="da-DK" dirty="0"/>
-          </a:p>
-        </p:txBody>
-      </p:sp>
-      <p:sp>
-        <p:nvSpPr>
-          <p:cNvPr id="78" name="Rectangle 77"/>
-          <p:cNvSpPr/>
-          <p:nvPr/>
-        </p:nvSpPr>
-        <p:spPr>
-          <a:xfrm>
-            <a:off x="9438149" y="2250327"/>
-            <a:ext cx="2684849" cy="860611"/>
-          </a:xfrm>
-          <a:prstGeom prst="rect">
-            <a:avLst/>
-          </a:prstGeom>
-        </p:spPr>
-        <p:style>
-          <a:lnRef idx="2">
-            <a:schemeClr val="accent1">
-              <a:shade val="50000"/>
-            </a:schemeClr>
-          </a:lnRef>
-          <a:fillRef idx="1">
-            <a:schemeClr val="accent1"/>
-          </a:fillRef>
-          <a:effectRef idx="0">
-            <a:schemeClr val="accent1"/>
-          </a:effectRef>
-          <a:fontRef idx="minor">
-            <a:schemeClr val="lt1"/>
-          </a:fontRef>
-        </p:style>
-        <p:txBody>
-          <a:bodyPr rtlCol="0" anchor="ctr"/>
-          <a:lstStyle/>
-          <a:p>
-            <a:pPr algn="ctr"/>
-            <a:r>
-              <a:rPr lang="da-DK" sz="1400" dirty="0" smtClean="0"/>
-              <a:t>SPATIAL LONG TERM DYNAMIC MODELLING </a:t>
-            </a:r>
-            <a:r>
-              <a:rPr lang="da-DK" sz="1400" dirty="0" err="1" smtClean="0"/>
-              <a:t>e.g</a:t>
-            </a:r>
-            <a:r>
-              <a:rPr lang="da-DK" sz="1400" dirty="0" smtClean="0"/>
-              <a:t>. DISPLACE/SMART/</a:t>
-            </a:r>
-            <a:r>
-              <a:rPr lang="da-DK" sz="1400" dirty="0" err="1" smtClean="0"/>
-              <a:t>FishRent</a:t>
-            </a:r>
-            <a:endParaRPr lang="da-DK" dirty="0"/>
-          </a:p>
-        </p:txBody>
-      </p:sp>
-      <p:cxnSp>
-        <p:nvCxnSpPr>
-          <p:cNvPr id="79" name="Elbow Connector 78"/>
-          <p:cNvCxnSpPr>
-            <a:stCxn id="78" idx="2"/>
-            <a:endCxn id="77" idx="0"/>
-          </p:cNvCxnSpPr>
-          <p:nvPr/>
-        </p:nvCxnSpPr>
-        <p:spPr>
-          <a:xfrm rot="16200000" flipH="1">
-            <a:off x="10287118" y="3604393"/>
-            <a:ext cx="986913" cy="1"/>
+          <a:xfrm flipV="1">
+            <a:off x="8890076" y="4147980"/>
+            <a:ext cx="273927" cy="1"/>
           </a:xfrm>
           <a:prstGeom prst="bentConnector3">
             <a:avLst>
@@ -8942,14 +8806,14 @@
       </p:cxnSp>
       <p:sp>
         <p:nvSpPr>
-          <p:cNvPr id="81" name="Rectangle 80"/>
+          <p:cNvPr id="77" name="Rectangle 76"/>
           <p:cNvSpPr/>
           <p:nvPr/>
         </p:nvSpPr>
         <p:spPr>
           <a:xfrm>
-            <a:off x="7704936" y="5642276"/>
-            <a:ext cx="2944905" cy="860611"/>
+            <a:off x="690401" y="-204819"/>
+            <a:ext cx="2484932" cy="679208"/>
           </a:xfrm>
           <a:prstGeom prst="rect">
             <a:avLst/>
@@ -8977,6 +8841,50 @@
           <a:p>
             <a:pPr algn="ctr"/>
             <a:r>
+              <a:rPr lang="da-DK" sz="1400" dirty="0" err="1" smtClean="0"/>
+              <a:t>ObtainEffortForecastFromDynamicView.R</a:t>
+            </a:r>
+            <a:endParaRPr lang="da-DK" dirty="0"/>
+          </a:p>
+        </p:txBody>
+      </p:sp>
+      <p:sp>
+        <p:nvSpPr>
+          <p:cNvPr id="81" name="Rectangle 80"/>
+          <p:cNvSpPr/>
+          <p:nvPr/>
+        </p:nvSpPr>
+        <p:spPr>
+          <a:xfrm>
+            <a:off x="7528124" y="4939749"/>
+            <a:ext cx="2944905" cy="860611"/>
+          </a:xfrm>
+          <a:prstGeom prst="rect">
+            <a:avLst/>
+          </a:prstGeom>
+        </p:spPr>
+        <p:style>
+          <a:lnRef idx="2">
+            <a:schemeClr val="accent1">
+              <a:shade val="50000"/>
+            </a:schemeClr>
+          </a:lnRef>
+          <a:fillRef idx="1">
+            <a:schemeClr val="accent1"/>
+          </a:fillRef>
+          <a:effectRef idx="0">
+            <a:schemeClr val="accent1"/>
+          </a:effectRef>
+          <a:fontRef idx="minor">
+            <a:schemeClr val="lt1"/>
+          </a:fontRef>
+        </p:style>
+        <p:txBody>
+          <a:bodyPr rtlCol="0" anchor="ctr"/>
+          <a:lstStyle/>
+          <a:p>
+            <a:pPr algn="ctr"/>
+            <a:r>
               <a:rPr lang="da-DK" sz="1400" dirty="0" smtClean="0"/>
               <a:t>WGFBIT </a:t>
             </a:r>
@@ -8991,78 +8899,6 @@
           </a:p>
         </p:txBody>
       </p:sp>
-      <p:cxnSp>
-        <p:nvCxnSpPr>
-          <p:cNvPr id="82" name="Elbow Connector 81"/>
-          <p:cNvCxnSpPr>
-            <a:stCxn id="77" idx="2"/>
-            <a:endCxn id="81" idx="3"/>
-          </p:cNvCxnSpPr>
-          <p:nvPr/>
-        </p:nvCxnSpPr>
-        <p:spPr>
-          <a:xfrm rot="5400000">
-            <a:off x="10158148" y="5450155"/>
-            <a:ext cx="1114120" cy="130734"/>
-          </a:xfrm>
-          <a:prstGeom prst="bentConnector2">
-            <a:avLst/>
-          </a:prstGeom>
-          <a:ln>
-            <a:tailEnd type="triangle"/>
-          </a:ln>
-        </p:spPr>
-        <p:style>
-          <a:lnRef idx="1">
-            <a:schemeClr val="accent1"/>
-          </a:lnRef>
-          <a:fillRef idx="0">
-            <a:schemeClr val="accent1"/>
-          </a:fillRef>
-          <a:effectRef idx="0">
-            <a:schemeClr val="accent1"/>
-          </a:effectRef>
-          <a:fontRef idx="minor">
-            <a:schemeClr val="tx1"/>
-          </a:fontRef>
-        </p:style>
-      </p:cxnSp>
-      <p:cxnSp>
-        <p:nvCxnSpPr>
-          <p:cNvPr id="83" name="Elbow Connector 82"/>
-          <p:cNvCxnSpPr>
-            <a:stCxn id="52" idx="6"/>
-            <a:endCxn id="78" idx="0"/>
-          </p:cNvCxnSpPr>
-          <p:nvPr/>
-        </p:nvCxnSpPr>
-        <p:spPr>
-          <a:xfrm>
-            <a:off x="8076418" y="1046904"/>
-            <a:ext cx="2704156" cy="1203423"/>
-          </a:xfrm>
-          <a:prstGeom prst="bentConnector2">
-            <a:avLst/>
-          </a:prstGeom>
-          <a:ln>
-            <a:tailEnd type="triangle"/>
-          </a:ln>
-        </p:spPr>
-        <p:style>
-          <a:lnRef idx="1">
-            <a:schemeClr val="accent1"/>
-          </a:lnRef>
-          <a:fillRef idx="0">
-            <a:schemeClr val="accent1"/>
-          </a:fillRef>
-          <a:effectRef idx="0">
-            <a:schemeClr val="accent1"/>
-          </a:effectRef>
-          <a:fontRef idx="minor">
-            <a:schemeClr val="tx1"/>
-          </a:fontRef>
-        </p:style>
-      </p:cxnSp>
       <p:cxnSp>
         <p:nvCxnSpPr>
           <p:cNvPr id="84" name="Elbow Connector 83"/>
@@ -9339,7 +9175,7 @@
         </p:nvSpPr>
         <p:spPr>
           <a:xfrm>
-            <a:off x="8437100" y="-98980"/>
+            <a:off x="9021911" y="-572062"/>
             <a:ext cx="2684849" cy="860611"/>
           </a:xfrm>
           <a:prstGeom prst="rect">
@@ -9423,18 +9259,20 @@
         <p:nvCxnSpPr>
           <p:cNvPr id="92" name="Elbow Connector 91"/>
           <p:cNvCxnSpPr>
-            <a:stCxn id="52" idx="7"/>
+            <a:stCxn id="52" idx="6"/>
             <a:endCxn id="91" idx="1"/>
           </p:cNvCxnSpPr>
           <p:nvPr/>
         </p:nvCxnSpPr>
         <p:spPr>
-          <a:xfrm rot="5400000" flipH="1" flipV="1">
-            <a:off x="7937197" y="204695"/>
-            <a:ext cx="373272" cy="626534"/>
-          </a:xfrm>
-          <a:prstGeom prst="bentConnector2">
-            <a:avLst/>
+          <a:xfrm flipV="1">
+            <a:off x="8076418" y="-141756"/>
+            <a:ext cx="945493" cy="2438"/>
+          </a:xfrm>
+          <a:prstGeom prst="bentConnector3">
+            <a:avLst>
+              <a:gd name="adj1" fmla="val 50000"/>
+            </a:avLst>
           </a:prstGeom>
           <a:ln>
             <a:tailEnd type="triangle"/>
@@ -9683,13 +9521,13 @@
           <p:nvPr/>
         </p:nvCxnSpPr>
         <p:spPr>
-          <a:xfrm rot="16200000" flipH="1" flipV="1">
-            <a:off x="8143238" y="-1073477"/>
-            <a:ext cx="661790" cy="2610784"/>
+          <a:xfrm rot="16200000" flipV="1">
+            <a:off x="8740864" y="-2195535"/>
+            <a:ext cx="51350" cy="3195595"/>
           </a:xfrm>
           <a:prstGeom prst="bentConnector3">
             <a:avLst>
-              <a:gd name="adj1" fmla="val -34543"/>
+              <a:gd name="adj1" fmla="val 313914"/>
             </a:avLst>
           </a:prstGeom>
           <a:ln>
@@ -9721,8 +9559,8 @@
         </p:nvCxnSpPr>
         <p:spPr>
           <a:xfrm rot="16200000" flipH="1">
-            <a:off x="7012883" y="5380528"/>
-            <a:ext cx="860611" cy="523495"/>
+            <a:off x="6532363" y="4374294"/>
+            <a:ext cx="1455326" cy="536195"/>
           </a:xfrm>
           <a:prstGeom prst="bentConnector2">
             <a:avLst/>
@@ -9746,6 +9584,262 @@
           </a:fontRef>
         </p:style>
       </p:cxnSp>
+      <p:sp>
+        <p:nvSpPr>
+          <p:cNvPr id="67" name="Oval 66"/>
+          <p:cNvSpPr/>
+          <p:nvPr/>
+        </p:nvSpPr>
+        <p:spPr>
+          <a:xfrm>
+            <a:off x="3335979" y="-342024"/>
+            <a:ext cx="1815354" cy="968188"/>
+          </a:xfrm>
+          <a:prstGeom prst="ellipse">
+            <a:avLst/>
+          </a:prstGeom>
+        </p:spPr>
+        <p:style>
+          <a:lnRef idx="2">
+            <a:schemeClr val="accent1">
+              <a:shade val="50000"/>
+            </a:schemeClr>
+          </a:lnRef>
+          <a:fillRef idx="1">
+            <a:schemeClr val="accent1"/>
+          </a:fillRef>
+          <a:effectRef idx="0">
+            <a:schemeClr val="accent1"/>
+          </a:effectRef>
+          <a:fontRef idx="minor">
+            <a:schemeClr val="lt1"/>
+          </a:fontRef>
+        </p:style>
+        <p:txBody>
+          <a:bodyPr rtlCol="0" anchor="ctr"/>
+          <a:lstStyle/>
+          <a:p>
+            <a:pPr algn="ctr"/>
+            <a:r>
+              <a:rPr lang="da-DK" sz="1400" dirty="0" smtClean="0"/>
+              <a:t>Raster </a:t>
+            </a:r>
+            <a:r>
+              <a:rPr lang="da-DK" sz="1400" dirty="0" err="1"/>
+              <a:t>e</a:t>
+            </a:r>
+            <a:r>
+              <a:rPr lang="da-DK" sz="1400" dirty="0" err="1" smtClean="0"/>
+              <a:t>ffortForecast</a:t>
+            </a:r>
+            <a:endParaRPr lang="da-DK" sz="1400" dirty="0"/>
+          </a:p>
+        </p:txBody>
+      </p:sp>
+      <p:cxnSp>
+        <p:nvCxnSpPr>
+          <p:cNvPr id="80" name="Elbow Connector 79"/>
+          <p:cNvCxnSpPr>
+            <a:stCxn id="52" idx="1"/>
+            <a:endCxn id="140" idx="0"/>
+          </p:cNvCxnSpPr>
+          <p:nvPr/>
+        </p:nvCxnSpPr>
+        <p:spPr>
+          <a:xfrm rot="16200000" flipH="1" flipV="1">
+            <a:off x="2761607" y="-4203606"/>
+            <a:ext cx="43328" cy="7487291"/>
+          </a:xfrm>
+          <a:prstGeom prst="bentConnector3">
+            <a:avLst>
+              <a:gd name="adj1" fmla="val -854847"/>
+            </a:avLst>
+          </a:prstGeom>
+          <a:ln>
+            <a:tailEnd type="triangle"/>
+          </a:ln>
+        </p:spPr>
+        <p:style>
+          <a:lnRef idx="1">
+            <a:schemeClr val="accent1"/>
+          </a:lnRef>
+          <a:fillRef idx="0">
+            <a:schemeClr val="accent1"/>
+          </a:fillRef>
+          <a:effectRef idx="0">
+            <a:schemeClr val="accent1"/>
+          </a:effectRef>
+          <a:fontRef idx="minor">
+            <a:schemeClr val="tx1"/>
+          </a:fontRef>
+        </p:style>
+      </p:cxnSp>
+      <p:cxnSp>
+        <p:nvCxnSpPr>
+          <p:cNvPr id="97" name="Elbow Connector 96"/>
+          <p:cNvCxnSpPr>
+            <a:stCxn id="67" idx="6"/>
+            <a:endCxn id="70" idx="1"/>
+          </p:cNvCxnSpPr>
+          <p:nvPr/>
+        </p:nvCxnSpPr>
+        <p:spPr>
+          <a:xfrm>
+            <a:off x="5151333" y="142070"/>
+            <a:ext cx="310477" cy="2081884"/>
+          </a:xfrm>
+          <a:prstGeom prst="bentConnector3">
+            <a:avLst>
+              <a:gd name="adj1" fmla="val 50000"/>
+            </a:avLst>
+          </a:prstGeom>
+          <a:ln>
+            <a:tailEnd type="triangle"/>
+          </a:ln>
+        </p:spPr>
+        <p:style>
+          <a:lnRef idx="1">
+            <a:schemeClr val="accent1"/>
+          </a:lnRef>
+          <a:fillRef idx="0">
+            <a:schemeClr val="accent1"/>
+          </a:fillRef>
+          <a:effectRef idx="0">
+            <a:schemeClr val="accent1"/>
+          </a:effectRef>
+          <a:fontRef idx="minor">
+            <a:schemeClr val="tx1"/>
+          </a:fontRef>
+        </p:style>
+      </p:cxnSp>
+      <p:cxnSp>
+        <p:nvCxnSpPr>
+          <p:cNvPr id="125" name="Elbow Connector 124"/>
+          <p:cNvCxnSpPr>
+            <a:stCxn id="140" idx="6"/>
+            <a:endCxn id="77" idx="1"/>
+          </p:cNvCxnSpPr>
+          <p:nvPr/>
+        </p:nvCxnSpPr>
+        <p:spPr>
+          <a:xfrm>
+            <a:off x="490484" y="128443"/>
+            <a:ext cx="199917" cy="6342"/>
+          </a:xfrm>
+          <a:prstGeom prst="bentConnector3">
+            <a:avLst/>
+          </a:prstGeom>
+          <a:ln>
+            <a:tailEnd type="triangle"/>
+          </a:ln>
+        </p:spPr>
+        <p:style>
+          <a:lnRef idx="1">
+            <a:schemeClr val="accent1"/>
+          </a:lnRef>
+          <a:fillRef idx="0">
+            <a:schemeClr val="accent1"/>
+          </a:fillRef>
+          <a:effectRef idx="0">
+            <a:schemeClr val="accent1"/>
+          </a:effectRef>
+          <a:fontRef idx="minor">
+            <a:schemeClr val="tx1"/>
+          </a:fontRef>
+        </p:style>
+      </p:cxnSp>
+      <p:cxnSp>
+        <p:nvCxnSpPr>
+          <p:cNvPr id="127" name="Elbow Connector 126"/>
+          <p:cNvCxnSpPr>
+            <a:stCxn id="77" idx="3"/>
+            <a:endCxn id="67" idx="2"/>
+          </p:cNvCxnSpPr>
+          <p:nvPr/>
+        </p:nvCxnSpPr>
+        <p:spPr>
+          <a:xfrm>
+            <a:off x="3175333" y="134785"/>
+            <a:ext cx="160646" cy="7285"/>
+          </a:xfrm>
+          <a:prstGeom prst="bentConnector3">
+            <a:avLst/>
+          </a:prstGeom>
+          <a:ln>
+            <a:tailEnd type="triangle"/>
+          </a:ln>
+        </p:spPr>
+        <p:style>
+          <a:lnRef idx="1">
+            <a:schemeClr val="accent1"/>
+          </a:lnRef>
+          <a:fillRef idx="0">
+            <a:schemeClr val="accent1"/>
+          </a:fillRef>
+          <a:effectRef idx="0">
+            <a:schemeClr val="accent1"/>
+          </a:effectRef>
+          <a:fontRef idx="minor">
+            <a:schemeClr val="tx1"/>
+          </a:fontRef>
+        </p:style>
+      </p:cxnSp>
+      <p:sp>
+        <p:nvSpPr>
+          <p:cNvPr id="140" name="Oval 139"/>
+          <p:cNvSpPr/>
+          <p:nvPr/>
+        </p:nvSpPr>
+        <p:spPr>
+          <a:xfrm>
+            <a:off x="-2411234" y="-438296"/>
+            <a:ext cx="2901718" cy="1133478"/>
+          </a:xfrm>
+          <a:prstGeom prst="ellipse">
+            <a:avLst/>
+          </a:prstGeom>
+        </p:spPr>
+        <p:style>
+          <a:lnRef idx="2">
+            <a:schemeClr val="accent1">
+              <a:shade val="50000"/>
+            </a:schemeClr>
+          </a:lnRef>
+          <a:fillRef idx="1">
+            <a:schemeClr val="accent1"/>
+          </a:fillRef>
+          <a:effectRef idx="0">
+            <a:schemeClr val="accent1"/>
+          </a:effectRef>
+          <a:fontRef idx="minor">
+            <a:schemeClr val="lt1"/>
+          </a:fontRef>
+        </p:style>
+        <p:txBody>
+          <a:bodyPr rtlCol="0" anchor="ctr"/>
+          <a:lstStyle/>
+          <a:p>
+            <a:pPr algn="ctr"/>
+            <a:r>
+              <a:rPr lang="da-DK" sz="1200" dirty="0"/>
+              <a:t>SPATIAL LONG TERM DYNAMIC MODELLING </a:t>
+            </a:r>
+            <a:r>
+              <a:rPr lang="da-DK" sz="1200" dirty="0" smtClean="0"/>
+              <a:t>(DISPLACE/SMART/</a:t>
+            </a:r>
+            <a:r>
+              <a:rPr lang="da-DK" sz="1200" dirty="0" err="1" smtClean="0"/>
+              <a:t>FishRent</a:t>
+            </a:r>
+            <a:r>
+              <a:rPr lang="da-DK" sz="1200" dirty="0" smtClean="0"/>
+              <a:t>)</a:t>
+            </a:r>
+            <a:endParaRPr lang="da-DK" sz="1200" dirty="0"/>
+          </a:p>
+        </p:txBody>
+      </p:sp>
     </p:spTree>
     <p:extLst>
       <p:ext uri="{BB962C8B-B14F-4D97-AF65-F5344CB8AC3E}">

</xml_diff>

<commit_message>
Some file renaming to ease the understanding
</commit_message>
<xml_diff>
--- a/WKTRADE2_R_workflow.pptx
+++ b/WKTRADE2_R_workflow.pptx
@@ -7828,7 +7828,7 @@
         </p:nvSpPr>
         <p:spPr>
           <a:xfrm>
-            <a:off x="-8345" y="1882896"/>
+            <a:off x="-8345" y="1737754"/>
             <a:ext cx="2719720" cy="463988"/>
           </a:xfrm>
           <a:prstGeom prst="rect">
@@ -7872,7 +7872,7 @@
         </p:nvSpPr>
         <p:spPr>
           <a:xfrm>
-            <a:off x="-29685" y="3107171"/>
+            <a:off x="-29685" y="2962029"/>
             <a:ext cx="2741060" cy="566988"/>
           </a:xfrm>
           <a:prstGeom prst="rect">
@@ -7928,8 +7928,8 @@
         </p:nvSpPr>
         <p:spPr>
           <a:xfrm>
-            <a:off x="3329232" y="1240862"/>
-            <a:ext cx="1815354" cy="968188"/>
+            <a:off x="3329232" y="1373020"/>
+            <a:ext cx="1668559" cy="836030"/>
           </a:xfrm>
           <a:prstGeom prst="ellipse">
             <a:avLst/>
@@ -7972,8 +7972,8 @@
         </p:nvSpPr>
         <p:spPr>
           <a:xfrm>
-            <a:off x="3335582" y="3362664"/>
-            <a:ext cx="1815354" cy="968188"/>
+            <a:off x="3320641" y="3177025"/>
+            <a:ext cx="1571220" cy="747611"/>
           </a:xfrm>
           <a:prstGeom prst="ellipse">
             <a:avLst/>
@@ -8020,7 +8020,7 @@
         </p:nvSpPr>
         <p:spPr>
           <a:xfrm>
-            <a:off x="-2072976" y="3341147"/>
+            <a:off x="-2072976" y="3196005"/>
             <a:ext cx="1602242" cy="755514"/>
           </a:xfrm>
           <a:prstGeom prst="ellipse">
@@ -8084,7 +8084,7 @@
         </p:nvSpPr>
         <p:spPr>
           <a:xfrm>
-            <a:off x="-52609" y="3804199"/>
+            <a:off x="-52609" y="3659057"/>
             <a:ext cx="2763983" cy="584924"/>
           </a:xfrm>
           <a:prstGeom prst="rect">
@@ -8114,7 +8114,7 @@
             <a:pPr algn="ctr"/>
             <a:r>
               <a:rPr lang="da-DK" sz="1400" dirty="0" err="1" smtClean="0"/>
-              <a:t>ObtainRasterGVADisagregated.R</a:t>
+              <a:t>ObtainRasterGVA.R</a:t>
             </a:r>
             <a:endParaRPr lang="da-DK" dirty="0"/>
           </a:p>
@@ -8128,7 +8128,7 @@
         </p:nvSpPr>
         <p:spPr>
           <a:xfrm>
-            <a:off x="-21230" y="2512129"/>
+            <a:off x="-21230" y="2366987"/>
             <a:ext cx="2732605" cy="448242"/>
           </a:xfrm>
           <a:prstGeom prst="rect">
@@ -8172,8 +8172,8 @@
         </p:nvSpPr>
         <p:spPr>
           <a:xfrm>
-            <a:off x="3335582" y="2334001"/>
-            <a:ext cx="1815354" cy="968188"/>
+            <a:off x="3335582" y="2333853"/>
+            <a:ext cx="1602343" cy="719171"/>
           </a:xfrm>
           <a:prstGeom prst="ellipse">
             <a:avLst/>
@@ -8271,7 +8271,7 @@
         </p:nvCxnSpPr>
         <p:spPr>
           <a:xfrm flipV="1">
-            <a:off x="-470734" y="3390665"/>
+            <a:off x="-470734" y="3245523"/>
             <a:ext cx="441049" cy="328239"/>
           </a:xfrm>
           <a:prstGeom prst="bentConnector3">
@@ -8309,7 +8309,7 @@
         </p:nvCxnSpPr>
         <p:spPr>
           <a:xfrm>
-            <a:off x="-470734" y="3718904"/>
+            <a:off x="-470734" y="3573762"/>
             <a:ext cx="418125" cy="377757"/>
           </a:xfrm>
           <a:prstGeom prst="bentConnector3">
@@ -8347,7 +8347,7 @@
         </p:nvCxnSpPr>
         <p:spPr>
           <a:xfrm flipV="1">
-            <a:off x="-470734" y="2736250"/>
+            <a:off x="-470734" y="2591108"/>
             <a:ext cx="449504" cy="16385"/>
           </a:xfrm>
           <a:prstGeom prst="bentConnector3">
@@ -8383,8 +8383,8 @@
         </p:nvCxnSpPr>
         <p:spPr>
           <a:xfrm flipV="1">
-            <a:off x="2711375" y="1724956"/>
-            <a:ext cx="617857" cy="389934"/>
+            <a:off x="2711375" y="1791035"/>
+            <a:ext cx="617857" cy="178713"/>
           </a:xfrm>
           <a:prstGeom prst="bentConnector3">
             <a:avLst/>
@@ -8419,8 +8419,8 @@
         </p:nvCxnSpPr>
         <p:spPr>
           <a:xfrm>
-            <a:off x="2711375" y="2736250"/>
-            <a:ext cx="624207" cy="81845"/>
+            <a:off x="2711375" y="2591108"/>
+            <a:ext cx="624207" cy="102331"/>
           </a:xfrm>
           <a:prstGeom prst="bentConnector3">
             <a:avLst/>
@@ -8455,8 +8455,8 @@
         </p:nvCxnSpPr>
         <p:spPr>
           <a:xfrm>
-            <a:off x="2711375" y="3390665"/>
-            <a:ext cx="624207" cy="456093"/>
+            <a:off x="2711375" y="3245523"/>
+            <a:ext cx="609266" cy="305308"/>
           </a:xfrm>
           <a:prstGeom prst="bentConnector3">
             <a:avLst/>
@@ -8488,8 +8488,8 @@
         </p:nvSpPr>
         <p:spPr>
           <a:xfrm>
-            <a:off x="3335582" y="4455655"/>
-            <a:ext cx="1815354" cy="968188"/>
+            <a:off x="3410084" y="4021390"/>
+            <a:ext cx="1481777" cy="748339"/>
           </a:xfrm>
           <a:prstGeom prst="ellipse">
             <a:avLst/>
@@ -8910,8 +8910,8 @@
         </p:nvCxnSpPr>
         <p:spPr>
           <a:xfrm>
-            <a:off x="2711374" y="4096661"/>
-            <a:ext cx="624208" cy="843088"/>
+            <a:off x="2711374" y="3951519"/>
+            <a:ext cx="698710" cy="444041"/>
           </a:xfrm>
           <a:prstGeom prst="bentConnector3">
             <a:avLst/>
@@ -8943,7 +8943,7 @@
         </p:nvSpPr>
         <p:spPr>
           <a:xfrm>
-            <a:off x="-52610" y="4518205"/>
+            <a:off x="-52610" y="4373063"/>
             <a:ext cx="2763983" cy="547081"/>
           </a:xfrm>
           <a:prstGeom prst="rect">
@@ -8972,8 +8972,8 @@
           <a:p>
             <a:pPr algn="ctr"/>
             <a:r>
-              <a:rPr lang="da-DK" sz="1400" dirty="0" smtClean="0"/>
-              <a:t>Etc.</a:t>
+              <a:rPr lang="da-DK" sz="1400" dirty="0" err="1" smtClean="0"/>
+              <a:t>ObtainExpectedProfit</a:t>
             </a:r>
             <a:endParaRPr lang="da-DK" sz="1400" dirty="0"/>
           </a:p>
@@ -8990,8 +8990,8 @@
         </p:nvCxnSpPr>
         <p:spPr>
           <a:xfrm>
-            <a:off x="5144586" y="1724956"/>
-            <a:ext cx="317224" cy="498998"/>
+            <a:off x="4997791" y="1791035"/>
+            <a:ext cx="464019" cy="432919"/>
           </a:xfrm>
           <a:prstGeom prst="bentConnector3">
             <a:avLst/>
@@ -9026,8 +9026,8 @@
         </p:nvCxnSpPr>
         <p:spPr>
           <a:xfrm flipV="1">
-            <a:off x="5150936" y="2223954"/>
-            <a:ext cx="310874" cy="594141"/>
+            <a:off x="4937925" y="2223954"/>
+            <a:ext cx="523885" cy="469485"/>
           </a:xfrm>
           <a:prstGeom prst="bentConnector3">
             <a:avLst/>
@@ -9062,8 +9062,8 @@
         </p:nvCxnSpPr>
         <p:spPr>
           <a:xfrm flipV="1">
-            <a:off x="5150936" y="2223954"/>
-            <a:ext cx="310874" cy="1622804"/>
+            <a:off x="4891861" y="2223954"/>
+            <a:ext cx="569949" cy="1326877"/>
           </a:xfrm>
           <a:prstGeom prst="bentConnector3">
             <a:avLst/>
@@ -9098,8 +9098,8 @@
         </p:nvCxnSpPr>
         <p:spPr>
           <a:xfrm flipV="1">
-            <a:off x="5150936" y="2223954"/>
-            <a:ext cx="310874" cy="2715795"/>
+            <a:off x="4891861" y="2223954"/>
+            <a:ext cx="569949" cy="2171606"/>
           </a:xfrm>
           <a:prstGeom prst="bentConnector3">
             <a:avLst/>
@@ -9131,7 +9131,7 @@
         </p:nvSpPr>
         <p:spPr>
           <a:xfrm>
-            <a:off x="-2011286" y="2420301"/>
+            <a:off x="-2011286" y="2275159"/>
             <a:ext cx="1540552" cy="664668"/>
           </a:xfrm>
           <a:prstGeom prst="ellipse">
@@ -9840,6 +9840,166 @@
           </a:p>
         </p:txBody>
       </p:sp>
+      <p:sp>
+        <p:nvSpPr>
+          <p:cNvPr id="51" name="Rectangle 50"/>
+          <p:cNvSpPr/>
+          <p:nvPr/>
+        </p:nvSpPr>
+        <p:spPr>
+          <a:xfrm>
+            <a:off x="-59867" y="4974526"/>
+            <a:ext cx="2763983" cy="301216"/>
+          </a:xfrm>
+          <a:prstGeom prst="rect">
+            <a:avLst/>
+          </a:prstGeom>
+        </p:spPr>
+        <p:style>
+          <a:lnRef idx="2">
+            <a:schemeClr val="accent1">
+              <a:shade val="50000"/>
+            </a:schemeClr>
+          </a:lnRef>
+          <a:fillRef idx="1">
+            <a:schemeClr val="accent1"/>
+          </a:fillRef>
+          <a:effectRef idx="0">
+            <a:schemeClr val="accent1"/>
+          </a:effectRef>
+          <a:fontRef idx="minor">
+            <a:schemeClr val="lt1"/>
+          </a:fontRef>
+        </p:style>
+        <p:txBody>
+          <a:bodyPr rtlCol="0" anchor="ctr"/>
+          <a:lstStyle/>
+          <a:p>
+            <a:pPr algn="ctr"/>
+            <a:r>
+              <a:rPr lang="da-DK" sz="1400" dirty="0" smtClean="0"/>
+              <a:t>Etc.</a:t>
+            </a:r>
+            <a:endParaRPr lang="da-DK" sz="1400" dirty="0"/>
+          </a:p>
+        </p:txBody>
+      </p:sp>
+      <p:sp>
+        <p:nvSpPr>
+          <p:cNvPr id="73" name="Oval 72"/>
+          <p:cNvSpPr/>
+          <p:nvPr/>
+        </p:nvSpPr>
+        <p:spPr>
+          <a:xfrm>
+            <a:off x="3386738" y="4854218"/>
+            <a:ext cx="1481777" cy="748339"/>
+          </a:xfrm>
+          <a:prstGeom prst="ellipse">
+            <a:avLst/>
+          </a:prstGeom>
+        </p:spPr>
+        <p:style>
+          <a:lnRef idx="2">
+            <a:schemeClr val="accent1">
+              <a:shade val="50000"/>
+            </a:schemeClr>
+          </a:lnRef>
+          <a:fillRef idx="1">
+            <a:schemeClr val="accent1"/>
+          </a:fillRef>
+          <a:effectRef idx="0">
+            <a:schemeClr val="accent1"/>
+          </a:effectRef>
+          <a:fontRef idx="minor">
+            <a:schemeClr val="lt1"/>
+          </a:fontRef>
+        </p:style>
+        <p:txBody>
+          <a:bodyPr rtlCol="0" anchor="ctr"/>
+          <a:lstStyle/>
+          <a:p>
+            <a:pPr algn="ctr"/>
+            <a:r>
+              <a:rPr lang="da-DK" sz="1400" dirty="0" smtClean="0"/>
+              <a:t>Raster Profit</a:t>
+            </a:r>
+            <a:endParaRPr lang="da-DK" sz="1400" dirty="0"/>
+          </a:p>
+        </p:txBody>
+      </p:sp>
+      <p:cxnSp>
+        <p:nvCxnSpPr>
+          <p:cNvPr id="22" name="Elbow Connector 21"/>
+          <p:cNvCxnSpPr>
+            <a:stCxn id="85" idx="3"/>
+            <a:endCxn id="73" idx="2"/>
+          </p:cNvCxnSpPr>
+          <p:nvPr/>
+        </p:nvCxnSpPr>
+        <p:spPr>
+          <a:xfrm>
+            <a:off x="2711373" y="4646604"/>
+            <a:ext cx="675365" cy="581784"/>
+          </a:xfrm>
+          <a:prstGeom prst="bentConnector3">
+            <a:avLst/>
+          </a:prstGeom>
+          <a:ln>
+            <a:tailEnd type="triangle"/>
+          </a:ln>
+        </p:spPr>
+        <p:style>
+          <a:lnRef idx="1">
+            <a:schemeClr val="accent1"/>
+          </a:lnRef>
+          <a:fillRef idx="0">
+            <a:schemeClr val="accent1"/>
+          </a:fillRef>
+          <a:effectRef idx="0">
+            <a:schemeClr val="accent1"/>
+          </a:effectRef>
+          <a:fontRef idx="minor">
+            <a:schemeClr val="tx1"/>
+          </a:fontRef>
+        </p:style>
+      </p:cxnSp>
+      <p:cxnSp>
+        <p:nvCxnSpPr>
+          <p:cNvPr id="24" name="Elbow Connector 23"/>
+          <p:cNvCxnSpPr>
+            <a:stCxn id="73" idx="6"/>
+            <a:endCxn id="70" idx="1"/>
+          </p:cNvCxnSpPr>
+          <p:nvPr/>
+        </p:nvCxnSpPr>
+        <p:spPr>
+          <a:xfrm flipV="1">
+            <a:off x="4868515" y="2223954"/>
+            <a:ext cx="593295" cy="3004434"/>
+          </a:xfrm>
+          <a:prstGeom prst="bentConnector3">
+            <a:avLst/>
+          </a:prstGeom>
+          <a:ln>
+            <a:tailEnd type="triangle"/>
+          </a:ln>
+        </p:spPr>
+        <p:style>
+          <a:lnRef idx="1">
+            <a:schemeClr val="accent1"/>
+          </a:lnRef>
+          <a:fillRef idx="0">
+            <a:schemeClr val="accent1"/>
+          </a:fillRef>
+          <a:effectRef idx="0">
+            <a:schemeClr val="accent1"/>
+          </a:effectRef>
+          <a:fontRef idx="minor">
+            <a:schemeClr val="tx1"/>
+          </a:fontRef>
+        </p:style>
+      </p:cxnSp>
     </p:spTree>
     <p:extLst>
       <p:ext uri="{BB962C8B-B14F-4D97-AF65-F5344CB8AC3E}">

</xml_diff>

<commit_message>
Adding entry point for raster on mutually-exclusive marine use
</commit_message>
<xml_diff>
--- a/WKTRADE2_R_workflow.pptx
+++ b/WKTRADE2_R_workflow.pptx
@@ -300,7 +300,7 @@
           <a:p>
             <a:fld id="{0804A3E0-26E0-4A89-A33E-47059F87E0AD}" type="datetimeFigureOut">
               <a:rPr lang="da-DK" smtClean="0"/>
-              <a:t>28-08-2019</a:t>
+              <a:t>29-08-2019</a:t>
             </a:fld>
             <a:endParaRPr lang="da-DK"/>
           </a:p>
@@ -638,7 +638,7 @@
           <a:p>
             <a:fld id="{0804A3E0-26E0-4A89-A33E-47059F87E0AD}" type="datetimeFigureOut">
               <a:rPr lang="da-DK" smtClean="0"/>
-              <a:t>28-08-2019</a:t>
+              <a:t>29-08-2019</a:t>
             </a:fld>
             <a:endParaRPr lang="da-DK"/>
           </a:p>
@@ -1039,7 +1039,7 @@
           <a:p>
             <a:fld id="{0804A3E0-26E0-4A89-A33E-47059F87E0AD}" type="datetimeFigureOut">
               <a:rPr lang="da-DK" smtClean="0"/>
-              <a:t>28-08-2019</a:t>
+              <a:t>29-08-2019</a:t>
             </a:fld>
             <a:endParaRPr lang="da-DK"/>
           </a:p>
@@ -1375,7 +1375,7 @@
           <a:p>
             <a:fld id="{0804A3E0-26E0-4A89-A33E-47059F87E0AD}" type="datetimeFigureOut">
               <a:rPr lang="da-DK" smtClean="0"/>
-              <a:t>28-08-2019</a:t>
+              <a:t>29-08-2019</a:t>
             </a:fld>
             <a:endParaRPr lang="da-DK"/>
           </a:p>
@@ -1695,7 +1695,7 @@
           <a:p>
             <a:fld id="{0804A3E0-26E0-4A89-A33E-47059F87E0AD}" type="datetimeFigureOut">
               <a:rPr lang="da-DK" smtClean="0"/>
-              <a:t>28-08-2019</a:t>
+              <a:t>29-08-2019</a:t>
             </a:fld>
             <a:endParaRPr lang="da-DK"/>
           </a:p>
@@ -2091,7 +2091,7 @@
           <a:p>
             <a:fld id="{0804A3E0-26E0-4A89-A33E-47059F87E0AD}" type="datetimeFigureOut">
               <a:rPr lang="da-DK" smtClean="0"/>
-              <a:t>28-08-2019</a:t>
+              <a:t>29-08-2019</a:t>
             </a:fld>
             <a:endParaRPr lang="da-DK"/>
           </a:p>
@@ -2348,7 +2348,7 @@
           <a:p>
             <a:fld id="{0804A3E0-26E0-4A89-A33E-47059F87E0AD}" type="datetimeFigureOut">
               <a:rPr lang="da-DK" smtClean="0"/>
-              <a:t>28-08-2019</a:t>
+              <a:t>29-08-2019</a:t>
             </a:fld>
             <a:endParaRPr lang="da-DK"/>
           </a:p>
@@ -2610,7 +2610,7 @@
           <a:p>
             <a:fld id="{0804A3E0-26E0-4A89-A33E-47059F87E0AD}" type="datetimeFigureOut">
               <a:rPr lang="da-DK" smtClean="0"/>
-              <a:t>28-08-2019</a:t>
+              <a:t>29-08-2019</a:t>
             </a:fld>
             <a:endParaRPr lang="da-DK"/>
           </a:p>
@@ -2872,7 +2872,7 @@
           <a:p>
             <a:fld id="{0804A3E0-26E0-4A89-A33E-47059F87E0AD}" type="datetimeFigureOut">
               <a:rPr lang="da-DK" smtClean="0"/>
-              <a:t>28-08-2019</a:t>
+              <a:t>29-08-2019</a:t>
             </a:fld>
             <a:endParaRPr lang="da-DK"/>
           </a:p>
@@ -3201,7 +3201,7 @@
           <a:p>
             <a:fld id="{0804A3E0-26E0-4A89-A33E-47059F87E0AD}" type="datetimeFigureOut">
               <a:rPr lang="da-DK" smtClean="0"/>
-              <a:t>28-08-2019</a:t>
+              <a:t>29-08-2019</a:t>
             </a:fld>
             <a:endParaRPr lang="da-DK"/>
           </a:p>
@@ -3524,7 +3524,7 @@
           <a:p>
             <a:fld id="{0804A3E0-26E0-4A89-A33E-47059F87E0AD}" type="datetimeFigureOut">
               <a:rPr lang="da-DK" smtClean="0"/>
-              <a:t>28-08-2019</a:t>
+              <a:t>29-08-2019</a:t>
             </a:fld>
             <a:endParaRPr lang="da-DK"/>
           </a:p>
@@ -3981,7 +3981,7 @@
           <a:p>
             <a:fld id="{0804A3E0-26E0-4A89-A33E-47059F87E0AD}" type="datetimeFigureOut">
               <a:rPr lang="da-DK" smtClean="0"/>
-              <a:t>28-08-2019</a:t>
+              <a:t>29-08-2019</a:t>
             </a:fld>
             <a:endParaRPr lang="da-DK"/>
           </a:p>
@@ -4186,7 +4186,7 @@
           <a:p>
             <a:fld id="{0804A3E0-26E0-4A89-A33E-47059F87E0AD}" type="datetimeFigureOut">
               <a:rPr lang="da-DK" smtClean="0"/>
-              <a:t>28-08-2019</a:t>
+              <a:t>29-08-2019</a:t>
             </a:fld>
             <a:endParaRPr lang="da-DK"/>
           </a:p>
@@ -4363,7 +4363,7 @@
           <a:p>
             <a:fld id="{0804A3E0-26E0-4A89-A33E-47059F87E0AD}" type="datetimeFigureOut">
               <a:rPr lang="da-DK" smtClean="0"/>
-              <a:t>28-08-2019</a:t>
+              <a:t>29-08-2019</a:t>
             </a:fld>
             <a:endParaRPr lang="da-DK"/>
           </a:p>
@@ -4696,7 +4696,7 @@
           <a:p>
             <a:fld id="{0804A3E0-26E0-4A89-A33E-47059F87E0AD}" type="datetimeFigureOut">
               <a:rPr lang="da-DK" smtClean="0"/>
-              <a:t>28-08-2019</a:t>
+              <a:t>29-08-2019</a:t>
             </a:fld>
             <a:endParaRPr lang="da-DK"/>
           </a:p>
@@ -5041,7 +5041,7 @@
           <a:p>
             <a:fld id="{0804A3E0-26E0-4A89-A33E-47059F87E0AD}" type="datetimeFigureOut">
               <a:rPr lang="da-DK" smtClean="0"/>
-              <a:t>28-08-2019</a:t>
+              <a:t>29-08-2019</a:t>
             </a:fld>
             <a:endParaRPr lang="da-DK"/>
           </a:p>
@@ -7158,7 +7158,7 @@
           <a:p>
             <a:fld id="{0804A3E0-26E0-4A89-A33E-47059F87E0AD}" type="datetimeFigureOut">
               <a:rPr lang="da-DK" smtClean="0"/>
-              <a:t>28-08-2019</a:t>
+              <a:t>29-08-2019</a:t>
             </a:fld>
             <a:endParaRPr lang="da-DK"/>
           </a:p>
@@ -7684,8 +7684,8 @@
         </p:nvSpPr>
         <p:spPr>
           <a:xfrm>
-            <a:off x="-2184802" y="-853874"/>
-            <a:ext cx="14474700" cy="6548349"/>
+            <a:off x="1328324" y="-86112"/>
+            <a:ext cx="10862318" cy="6548349"/>
           </a:xfrm>
           <a:prstGeom prst="rect">
             <a:avLst/>
@@ -7720,7 +7720,7 @@
           <a:lstStyle/>
           <a:p>
             <a:pPr algn="ctr"/>
-            <a:endParaRPr lang="da-DK" dirty="0"/>
+            <a:endParaRPr lang="da-DK" sz="1200" dirty="0"/>
           </a:p>
         </p:txBody>
       </p:sp>
@@ -7732,8 +7732,8 @@
         </p:nvSpPr>
         <p:spPr>
           <a:xfrm>
-            <a:off x="-152245" y="1458245"/>
-            <a:ext cx="5582066" cy="4521318"/>
+            <a:off x="1081691" y="2227501"/>
+            <a:ext cx="5015782" cy="4582285"/>
           </a:xfrm>
           <a:prstGeom prst="rect">
             <a:avLst/>
@@ -7768,7 +7768,7 @@
           <a:lstStyle/>
           <a:p>
             <a:pPr algn="ctr"/>
-            <a:endParaRPr lang="da-DK" dirty="0"/>
+            <a:endParaRPr lang="da-DK" sz="1200" dirty="0"/>
           </a:p>
         </p:txBody>
       </p:sp>
@@ -7780,8 +7780,8 @@
         </p:nvSpPr>
         <p:spPr>
           <a:xfrm>
-            <a:off x="-2221673" y="670809"/>
-            <a:ext cx="5006181" cy="4673050"/>
+            <a:off x="0" y="1654247"/>
+            <a:ext cx="4498319" cy="4673050"/>
           </a:xfrm>
           <a:prstGeom prst="rect">
             <a:avLst/>
@@ -7816,7 +7816,7 @@
           <a:lstStyle/>
           <a:p>
             <a:pPr algn="ctr"/>
-            <a:endParaRPr lang="da-DK" dirty="0"/>
+            <a:endParaRPr lang="da-DK" sz="1200" dirty="0"/>
           </a:p>
         </p:txBody>
       </p:sp>
@@ -7828,8 +7828,8 @@
         </p:nvSpPr>
         <p:spPr>
           <a:xfrm>
-            <a:off x="-8345" y="1737754"/>
-            <a:ext cx="2719720" cy="463988"/>
+            <a:off x="1891854" y="2426424"/>
+            <a:ext cx="2053348" cy="312762"/>
           </a:xfrm>
           <a:prstGeom prst="rect">
             <a:avLst/>
@@ -7857,10 +7857,10 @@
           <a:p>
             <a:pPr algn="ctr"/>
             <a:r>
-              <a:rPr lang="da-DK" sz="1400" dirty="0" err="1" smtClean="0"/>
+              <a:rPr lang="da-DK" sz="1050" dirty="0" err="1" smtClean="0"/>
               <a:t>ObtainRasterDistanceToCoast.R</a:t>
             </a:r>
-            <a:endParaRPr lang="da-DK" sz="1400" dirty="0"/>
+            <a:endParaRPr lang="da-DK" sz="1050" dirty="0"/>
           </a:p>
         </p:txBody>
       </p:sp>
@@ -7872,8 +7872,8 @@
         </p:nvSpPr>
         <p:spPr>
           <a:xfrm>
-            <a:off x="-29685" y="2962029"/>
-            <a:ext cx="2741060" cy="566988"/>
+            <a:off x="1876198" y="3306610"/>
+            <a:ext cx="2053348" cy="455238"/>
           </a:xfrm>
           <a:prstGeom prst="rect">
             <a:avLst/>
@@ -7901,22 +7901,22 @@
           <a:p>
             <a:pPr algn="ctr"/>
             <a:r>
-              <a:rPr lang="da-DK" sz="1400" dirty="0" err="1" smtClean="0"/>
+              <a:rPr lang="da-DK" sz="1050" dirty="0" err="1" smtClean="0"/>
               <a:t>ObtainRasterFleetSpatialDependencies.R</a:t>
             </a:r>
             <a:r>
-              <a:rPr lang="da-DK" sz="1400" dirty="0" smtClean="0"/>
+              <a:rPr lang="da-DK" sz="1050" dirty="0" smtClean="0"/>
               <a:t> </a:t>
             </a:r>
             <a:r>
-              <a:rPr lang="da-DK" sz="1400" dirty="0" err="1" smtClean="0"/>
+              <a:rPr lang="da-DK" sz="1050" dirty="0" err="1" smtClean="0"/>
               <a:t>e.g</a:t>
             </a:r>
             <a:r>
-              <a:rPr lang="da-DK" sz="1400" dirty="0" smtClean="0"/>
+              <a:rPr lang="da-DK" sz="1050" dirty="0" smtClean="0"/>
               <a:t>. ISLA</a:t>
             </a:r>
-            <a:endParaRPr lang="da-DK" dirty="0"/>
+            <a:endParaRPr lang="da-DK" sz="1200" dirty="0"/>
           </a:p>
         </p:txBody>
       </p:sp>
@@ -7928,8 +7928,8 @@
         </p:nvSpPr>
         <p:spPr>
           <a:xfrm>
-            <a:off x="3329232" y="1373020"/>
-            <a:ext cx="1668559" cy="836030"/>
+            <a:off x="4800369" y="2245412"/>
+            <a:ext cx="964415" cy="551883"/>
           </a:xfrm>
           <a:prstGeom prst="ellipse">
             <a:avLst/>
@@ -7957,10 +7957,10 @@
           <a:p>
             <a:pPr algn="ctr"/>
             <a:r>
-              <a:rPr lang="da-DK" sz="1400" dirty="0" smtClean="0"/>
+              <a:rPr lang="da-DK" sz="1050" dirty="0" smtClean="0"/>
               <a:t>Raster dist2Coast</a:t>
             </a:r>
-            <a:endParaRPr lang="da-DK" sz="1400" dirty="0"/>
+            <a:endParaRPr lang="da-DK" sz="1050" dirty="0"/>
           </a:p>
         </p:txBody>
       </p:sp>
@@ -7972,8 +7972,8 @@
         </p:nvSpPr>
         <p:spPr>
           <a:xfrm>
-            <a:off x="3320641" y="3177025"/>
-            <a:ext cx="1571220" cy="747611"/>
+            <a:off x="4790136" y="3535223"/>
+            <a:ext cx="987485" cy="605250"/>
           </a:xfrm>
           <a:prstGeom prst="ellipse">
             <a:avLst/>
@@ -8001,14 +8001,14 @@
           <a:p>
             <a:pPr algn="ctr"/>
             <a:r>
-              <a:rPr lang="da-DK" sz="1400" dirty="0" smtClean="0"/>
+              <a:rPr lang="da-DK" sz="1050" dirty="0" smtClean="0"/>
               <a:t>Raster </a:t>
             </a:r>
             <a:r>
-              <a:rPr lang="da-DK" sz="1400" dirty="0" err="1" smtClean="0"/>
+              <a:rPr lang="da-DK" sz="1050" dirty="0" err="1" smtClean="0"/>
               <a:t>SpatialDepend</a:t>
             </a:r>
-            <a:endParaRPr lang="da-DK" sz="1400" dirty="0"/>
+            <a:endParaRPr lang="da-DK" sz="1050" dirty="0"/>
           </a:p>
         </p:txBody>
       </p:sp>
@@ -8020,8 +8020,8 @@
         </p:nvSpPr>
         <p:spPr>
           <a:xfrm>
-            <a:off x="-2072976" y="3196005"/>
-            <a:ext cx="1602242" cy="755514"/>
+            <a:off x="339257" y="3543147"/>
+            <a:ext cx="1111949" cy="568827"/>
           </a:xfrm>
           <a:prstGeom prst="ellipse">
             <a:avLst/>
@@ -8049,30 +8049,30 @@
           <a:p>
             <a:pPr algn="ctr"/>
             <a:r>
-              <a:rPr lang="da-DK" sz="1600" dirty="0" err="1" smtClean="0"/>
+              <a:rPr lang="da-DK" sz="1100" dirty="0" err="1" smtClean="0"/>
               <a:t>Logbooks</a:t>
             </a:r>
-            <a:endParaRPr lang="da-DK" sz="1600" dirty="0" smtClean="0"/>
+            <a:endParaRPr lang="da-DK" sz="1100" dirty="0" smtClean="0"/>
           </a:p>
           <a:p>
             <a:pPr algn="ctr"/>
             <a:r>
-              <a:rPr lang="da-DK" sz="1600" dirty="0" smtClean="0"/>
+              <a:rPr lang="da-DK" sz="1100" dirty="0" smtClean="0"/>
               <a:t>Or </a:t>
             </a:r>
             <a:r>
-              <a:rPr lang="da-DK" sz="1200" dirty="0" smtClean="0"/>
+              <a:rPr lang="da-DK" sz="1000" dirty="0" smtClean="0"/>
               <a:t>SECFISH</a:t>
             </a:r>
             <a:r>
-              <a:rPr lang="da-DK" sz="1600" dirty="0" smtClean="0"/>
+              <a:rPr lang="da-DK" sz="1100" dirty="0" smtClean="0"/>
               <a:t> </a:t>
             </a:r>
             <a:r>
-              <a:rPr lang="da-DK" sz="1600" dirty="0" err="1" smtClean="0"/>
+              <a:rPr lang="da-DK" sz="1100" dirty="0" err="1" smtClean="0"/>
               <a:t>routines</a:t>
             </a:r>
-            <a:endParaRPr lang="da-DK" sz="1600" dirty="0"/>
+            <a:endParaRPr lang="da-DK" sz="1100" dirty="0"/>
           </a:p>
         </p:txBody>
       </p:sp>
@@ -8084,8 +8084,8 @@
         </p:nvSpPr>
         <p:spPr>
           <a:xfrm>
-            <a:off x="-52609" y="3659057"/>
-            <a:ext cx="2763983" cy="584924"/>
+            <a:off x="1876198" y="3858333"/>
+            <a:ext cx="2053347" cy="388200"/>
           </a:xfrm>
           <a:prstGeom prst="rect">
             <a:avLst/>
@@ -8113,10 +8113,10 @@
           <a:p>
             <a:pPr algn="ctr"/>
             <a:r>
-              <a:rPr lang="da-DK" sz="1400" dirty="0" err="1" smtClean="0"/>
+              <a:rPr lang="da-DK" sz="1050" dirty="0" err="1" smtClean="0"/>
               <a:t>ObtainRasterGVA.R</a:t>
             </a:r>
-            <a:endParaRPr lang="da-DK" dirty="0"/>
+            <a:endParaRPr lang="da-DK" sz="1200" dirty="0"/>
           </a:p>
         </p:txBody>
       </p:sp>
@@ -8128,8 +8128,8 @@
         </p:nvSpPr>
         <p:spPr>
           <a:xfrm>
-            <a:off x="-21230" y="2366987"/>
-            <a:ext cx="2732605" cy="448242"/>
+            <a:off x="1883337" y="2858773"/>
+            <a:ext cx="2053348" cy="369180"/>
           </a:xfrm>
           <a:prstGeom prst="rect">
             <a:avLst/>
@@ -8157,10 +8157,10 @@
           <a:p>
             <a:pPr algn="ctr"/>
             <a:r>
-              <a:rPr lang="da-DK" sz="1400" dirty="0" err="1" smtClean="0"/>
+              <a:rPr lang="da-DK" sz="1050" dirty="0" err="1" smtClean="0"/>
               <a:t>ObtainRasterJRCOceanProd.R</a:t>
             </a:r>
-            <a:endParaRPr lang="da-DK" sz="1400" dirty="0"/>
+            <a:endParaRPr lang="da-DK" sz="1050" dirty="0"/>
           </a:p>
         </p:txBody>
       </p:sp>
@@ -8172,8 +8172,8 @@
         </p:nvSpPr>
         <p:spPr>
           <a:xfrm>
-            <a:off x="3335582" y="2333853"/>
-            <a:ext cx="1602343" cy="719171"/>
+            <a:off x="4794551" y="2900210"/>
+            <a:ext cx="937314" cy="573512"/>
           </a:xfrm>
           <a:prstGeom prst="ellipse">
             <a:avLst/>
@@ -8201,10 +8201,10 @@
           <a:p>
             <a:pPr algn="ctr"/>
             <a:r>
-              <a:rPr lang="da-DK" sz="1400" dirty="0" smtClean="0"/>
+              <a:rPr lang="da-DK" sz="1050" dirty="0" smtClean="0"/>
               <a:t>Raster OP/LPUE</a:t>
             </a:r>
-            <a:endParaRPr lang="da-DK" sz="1400" dirty="0"/>
+            <a:endParaRPr lang="da-DK" sz="1050" dirty="0"/>
           </a:p>
         </p:txBody>
       </p:sp>
@@ -8216,8 +8216,8 @@
         </p:nvSpPr>
         <p:spPr>
           <a:xfrm>
-            <a:off x="6261064" y="-623412"/>
-            <a:ext cx="1815354" cy="968188"/>
+            <a:off x="6767929" y="882232"/>
+            <a:ext cx="1288992" cy="678408"/>
           </a:xfrm>
           <a:prstGeom prst="ellipse">
             <a:avLst/>
@@ -8245,18 +8245,18 @@
           <a:p>
             <a:pPr algn="ctr"/>
             <a:r>
-              <a:rPr lang="da-DK" sz="1400" dirty="0" smtClean="0"/>
+              <a:rPr lang="da-DK" sz="1050" dirty="0" smtClean="0"/>
               <a:t>WGSFD </a:t>
             </a:r>
             <a:r>
-              <a:rPr lang="da-DK" sz="1400" dirty="0" err="1" smtClean="0"/>
+              <a:rPr lang="da-DK" sz="1050" dirty="0" err="1" smtClean="0"/>
               <a:t>Shape</a:t>
             </a:r>
             <a:r>
-              <a:rPr lang="da-DK" sz="1400" dirty="0" smtClean="0"/>
+              <a:rPr lang="da-DK" sz="1050" dirty="0" smtClean="0"/>
               <a:t> files</a:t>
             </a:r>
-            <a:endParaRPr lang="da-DK" sz="1400" dirty="0"/>
+            <a:endParaRPr lang="da-DK" sz="1050" dirty="0"/>
           </a:p>
         </p:txBody>
       </p:sp>
@@ -8271,8 +8271,8 @@
         </p:nvCxnSpPr>
         <p:spPr>
           <a:xfrm flipV="1">
-            <a:off x="-470734" y="3245523"/>
-            <a:ext cx="441049" cy="328239"/>
+            <a:off x="1451206" y="3534229"/>
+            <a:ext cx="424992" cy="293332"/>
           </a:xfrm>
           <a:prstGeom prst="bentConnector3">
             <a:avLst>
@@ -8309,8 +8309,8 @@
         </p:nvCxnSpPr>
         <p:spPr>
           <a:xfrm>
-            <a:off x="-470734" y="3573762"/>
-            <a:ext cx="418125" cy="377757"/>
+            <a:off x="1451206" y="3827561"/>
+            <a:ext cx="424992" cy="224872"/>
           </a:xfrm>
           <a:prstGeom prst="bentConnector3">
             <a:avLst>
@@ -8347,8 +8347,8 @@
         </p:nvCxnSpPr>
         <p:spPr>
           <a:xfrm flipV="1">
-            <a:off x="-470734" y="2591108"/>
-            <a:ext cx="449504" cy="16385"/>
+            <a:off x="1363556" y="3043363"/>
+            <a:ext cx="519781" cy="3346"/>
           </a:xfrm>
           <a:prstGeom prst="bentConnector3">
             <a:avLst/>
@@ -8383,8 +8383,8 @@
         </p:nvCxnSpPr>
         <p:spPr>
           <a:xfrm flipV="1">
-            <a:off x="2711375" y="1791035"/>
-            <a:ext cx="617857" cy="178713"/>
+            <a:off x="3945202" y="2521354"/>
+            <a:ext cx="855167" cy="61451"/>
           </a:xfrm>
           <a:prstGeom prst="bentConnector3">
             <a:avLst/>
@@ -8419,8 +8419,8 @@
         </p:nvCxnSpPr>
         <p:spPr>
           <a:xfrm>
-            <a:off x="2711375" y="2591108"/>
-            <a:ext cx="624207" cy="102331"/>
+            <a:off x="3936685" y="3043363"/>
+            <a:ext cx="857866" cy="143603"/>
           </a:xfrm>
           <a:prstGeom prst="bentConnector3">
             <a:avLst/>
@@ -8455,8 +8455,8 @@
         </p:nvCxnSpPr>
         <p:spPr>
           <a:xfrm>
-            <a:off x="2711375" y="3245523"/>
-            <a:ext cx="609266" cy="305308"/>
+            <a:off x="3929546" y="3534229"/>
+            <a:ext cx="860590" cy="303619"/>
           </a:xfrm>
           <a:prstGeom prst="bentConnector3">
             <a:avLst/>
@@ -8488,8 +8488,8 @@
         </p:nvSpPr>
         <p:spPr>
           <a:xfrm>
-            <a:off x="3410084" y="4021390"/>
-            <a:ext cx="1481777" cy="748339"/>
+            <a:off x="4783379" y="4234873"/>
+            <a:ext cx="915406" cy="573659"/>
           </a:xfrm>
           <a:prstGeom prst="ellipse">
             <a:avLst/>
@@ -8517,10 +8517,10 @@
           <a:p>
             <a:pPr algn="ctr"/>
             <a:r>
-              <a:rPr lang="da-DK" sz="1400" dirty="0" smtClean="0"/>
+              <a:rPr lang="da-DK" sz="1050" dirty="0" smtClean="0"/>
               <a:t>Raster GVA</a:t>
             </a:r>
-            <a:endParaRPr lang="da-DK" sz="1400" dirty="0"/>
+            <a:endParaRPr lang="da-DK" sz="1050" dirty="0"/>
           </a:p>
         </p:txBody>
       </p:sp>
@@ -8532,8 +8532,8 @@
         </p:nvSpPr>
         <p:spPr>
           <a:xfrm>
-            <a:off x="5459891" y="3717675"/>
-            <a:ext cx="3430185" cy="860611"/>
+            <a:off x="6242543" y="3205228"/>
+            <a:ext cx="2349374" cy="320835"/>
           </a:xfrm>
           <a:prstGeom prst="rect">
             <a:avLst/>
@@ -8561,10 +8561,10 @@
           <a:p>
             <a:pPr algn="ctr"/>
             <a:r>
-              <a:rPr lang="da-DK" sz="1400" dirty="0" err="1" smtClean="0"/>
+              <a:rPr lang="da-DK" sz="1050" dirty="0" err="1" smtClean="0"/>
               <a:t>ObtainProbabilityFieldForEffortDisplacement.R</a:t>
             </a:r>
-            <a:endParaRPr lang="da-DK" sz="1400" dirty="0"/>
+            <a:endParaRPr lang="da-DK" sz="1050" dirty="0"/>
           </a:p>
         </p:txBody>
       </p:sp>
@@ -8576,8 +8576,8 @@
         </p:nvSpPr>
         <p:spPr>
           <a:xfrm>
-            <a:off x="9164003" y="3717675"/>
-            <a:ext cx="3442133" cy="860610"/>
+            <a:off x="9065145" y="3172705"/>
+            <a:ext cx="2228030" cy="391981"/>
           </a:xfrm>
           <a:prstGeom prst="rect">
             <a:avLst/>
@@ -8605,10 +8605,10 @@
           <a:p>
             <a:pPr algn="ctr"/>
             <a:r>
-              <a:rPr lang="da-DK" sz="1400" dirty="0" err="1" smtClean="0"/>
+              <a:rPr lang="da-DK" sz="1050" dirty="0" err="1" smtClean="0"/>
               <a:t>SelectPolygonsToRestrictFromAugmentedShape.R</a:t>
             </a:r>
-            <a:endParaRPr lang="da-DK" sz="1400" dirty="0"/>
+            <a:endParaRPr lang="da-DK" sz="1050" dirty="0"/>
           </a:p>
         </p:txBody>
       </p:sp>
@@ -8620,8 +8620,8 @@
         </p:nvSpPr>
         <p:spPr>
           <a:xfrm>
-            <a:off x="5461810" y="1793648"/>
-            <a:ext cx="3426561" cy="860611"/>
+            <a:off x="6177850" y="2165347"/>
+            <a:ext cx="2466117" cy="337305"/>
           </a:xfrm>
           <a:prstGeom prst="rect">
             <a:avLst/>
@@ -8649,10 +8649,10 @@
           <a:p>
             <a:pPr algn="ctr"/>
             <a:r>
-              <a:rPr lang="da-DK" sz="1400" dirty="0" err="1" smtClean="0"/>
+              <a:rPr lang="da-DK" sz="1050" dirty="0" err="1" smtClean="0"/>
               <a:t>AddAttributeToShpFromRasterExtractorFromShpOverlay.R</a:t>
             </a:r>
-            <a:endParaRPr lang="da-DK" sz="1400" dirty="0"/>
+            <a:endParaRPr lang="da-DK" sz="1050" dirty="0"/>
           </a:p>
         </p:txBody>
       </p:sp>
@@ -8666,9 +8666,9 @@
           <p:nvPr/>
         </p:nvCxnSpPr>
         <p:spPr>
-          <a:xfrm rot="5400000">
-            <a:off x="6643330" y="3185914"/>
-            <a:ext cx="1063416" cy="107"/>
+          <a:xfrm rot="16200000" flipH="1">
+            <a:off x="7062781" y="2850779"/>
+            <a:ext cx="702576" cy="6321"/>
           </a:xfrm>
           <a:prstGeom prst="bentConnector3">
             <a:avLst>
@@ -8704,9 +8704,9 @@
           <p:nvPr/>
         </p:nvCxnSpPr>
         <p:spPr>
-          <a:xfrm rot="16200000" flipH="1">
-            <a:off x="6447480" y="1066037"/>
-            <a:ext cx="1448872" cy="6350"/>
+          <a:xfrm rot="5400000">
+            <a:off x="7109314" y="1862235"/>
+            <a:ext cx="604707" cy="1516"/>
           </a:xfrm>
           <a:prstGeom prst="bentConnector3">
             <a:avLst/>
@@ -8741,8 +8741,8 @@
         </p:nvCxnSpPr>
         <p:spPr>
           <a:xfrm rot="5400000">
-            <a:off x="10283165" y="4768150"/>
-            <a:ext cx="791770" cy="412041"/>
+            <a:off x="9408069" y="3919743"/>
+            <a:ext cx="1126148" cy="416035"/>
           </a:xfrm>
           <a:prstGeom prst="bentConnector2">
             <a:avLst/>
@@ -8776,9 +8776,9 @@
           <p:nvPr/>
         </p:nvCxnSpPr>
         <p:spPr>
-          <a:xfrm flipV="1">
-            <a:off x="8890076" y="4147980"/>
-            <a:ext cx="273927" cy="1"/>
+          <a:xfrm>
+            <a:off x="8591917" y="3365646"/>
+            <a:ext cx="473228" cy="3050"/>
           </a:xfrm>
           <a:prstGeom prst="bentConnector3">
             <a:avLst>
@@ -8812,8 +8812,8 @@
         </p:nvSpPr>
         <p:spPr>
           <a:xfrm>
-            <a:off x="690401" y="-204819"/>
-            <a:ext cx="2484932" cy="679208"/>
+            <a:off x="2694248" y="564438"/>
+            <a:ext cx="1596883" cy="590540"/>
           </a:xfrm>
           <a:prstGeom prst="rect">
             <a:avLst/>
@@ -8841,10 +8841,10 @@
           <a:p>
             <a:pPr algn="ctr"/>
             <a:r>
-              <a:rPr lang="da-DK" sz="1400" dirty="0" err="1" smtClean="0"/>
+              <a:rPr lang="da-DK" sz="1050" dirty="0" err="1" smtClean="0"/>
               <a:t>ObtainEffortForecastFromDynamicView.R</a:t>
             </a:r>
-            <a:endParaRPr lang="da-DK" dirty="0"/>
+            <a:endParaRPr lang="da-DK" sz="1200" dirty="0"/>
           </a:p>
         </p:txBody>
       </p:sp>
@@ -8856,8 +8856,8 @@
         </p:nvSpPr>
         <p:spPr>
           <a:xfrm>
-            <a:off x="7528124" y="4939749"/>
-            <a:ext cx="2944905" cy="860611"/>
+            <a:off x="7685564" y="4270211"/>
+            <a:ext cx="2077561" cy="841245"/>
           </a:xfrm>
           <a:prstGeom prst="rect">
             <a:avLst/>
@@ -8885,17 +8885,9 @@
           <a:p>
             <a:pPr algn="ctr"/>
             <a:r>
-              <a:rPr lang="da-DK" sz="1400" dirty="0" smtClean="0"/>
+              <a:rPr lang="da-DK" sz="1050" dirty="0" smtClean="0"/>
               <a:t>WGFBIT </a:t>
             </a:r>
-          </a:p>
-          <a:p>
-            <a:pPr algn="ctr"/>
-            <a:r>
-              <a:rPr lang="da-DK" sz="1400" dirty="0" smtClean="0"/>
-              <a:t>(or SPATIAL LONG TERM DYNAMICS MODELLING)</a:t>
-            </a:r>
-            <a:endParaRPr lang="da-DK" sz="1400" dirty="0"/>
           </a:p>
         </p:txBody>
       </p:sp>
@@ -8910,8 +8902,8 @@
         </p:nvCxnSpPr>
         <p:spPr>
           <a:xfrm>
-            <a:off x="2711374" y="3951519"/>
-            <a:ext cx="698710" cy="444041"/>
+            <a:off x="3929545" y="4052433"/>
+            <a:ext cx="853834" cy="469270"/>
           </a:xfrm>
           <a:prstGeom prst="bentConnector3">
             <a:avLst/>
@@ -8943,8 +8935,8 @@
         </p:nvSpPr>
         <p:spPr>
           <a:xfrm>
-            <a:off x="-52610" y="4373063"/>
-            <a:ext cx="2763983" cy="547081"/>
+            <a:off x="1883337" y="4379165"/>
+            <a:ext cx="2053346" cy="373471"/>
           </a:xfrm>
           <a:prstGeom prst="rect">
             <a:avLst/>
@@ -8972,10 +8964,10 @@
           <a:p>
             <a:pPr algn="ctr"/>
             <a:r>
-              <a:rPr lang="da-DK" sz="1400" dirty="0" err="1" smtClean="0"/>
+              <a:rPr lang="da-DK" sz="1050" dirty="0" err="1" smtClean="0"/>
               <a:t>ObtainExpectedProfit</a:t>
             </a:r>
-            <a:endParaRPr lang="da-DK" sz="1400" dirty="0"/>
+            <a:endParaRPr lang="da-DK" sz="1050" dirty="0"/>
           </a:p>
         </p:txBody>
       </p:sp>
@@ -8989,9 +8981,9 @@
           <p:nvPr/>
         </p:nvCxnSpPr>
         <p:spPr>
-          <a:xfrm>
-            <a:off x="4997791" y="1791035"/>
-            <a:ext cx="464019" cy="432919"/>
+          <a:xfrm flipV="1">
+            <a:off x="5764784" y="2334000"/>
+            <a:ext cx="413066" cy="187354"/>
           </a:xfrm>
           <a:prstGeom prst="bentConnector3">
             <a:avLst/>
@@ -9026,8 +9018,8 @@
         </p:nvCxnSpPr>
         <p:spPr>
           <a:xfrm flipV="1">
-            <a:off x="4937925" y="2223954"/>
-            <a:ext cx="523885" cy="469485"/>
+            <a:off x="5731865" y="2334000"/>
+            <a:ext cx="445985" cy="852966"/>
           </a:xfrm>
           <a:prstGeom prst="bentConnector3">
             <a:avLst/>
@@ -9062,8 +9054,8 @@
         </p:nvCxnSpPr>
         <p:spPr>
           <a:xfrm flipV="1">
-            <a:off x="4891861" y="2223954"/>
-            <a:ext cx="569949" cy="1326877"/>
+            <a:off x="5777621" y="2334000"/>
+            <a:ext cx="400229" cy="1503848"/>
           </a:xfrm>
           <a:prstGeom prst="bentConnector3">
             <a:avLst/>
@@ -9098,8 +9090,8 @@
         </p:nvCxnSpPr>
         <p:spPr>
           <a:xfrm flipV="1">
-            <a:off x="4891861" y="2223954"/>
-            <a:ext cx="569949" cy="2171606"/>
+            <a:off x="5698785" y="2334000"/>
+            <a:ext cx="479065" cy="2187703"/>
           </a:xfrm>
           <a:prstGeom prst="bentConnector3">
             <a:avLst/>
@@ -9131,8 +9123,8 @@
         </p:nvSpPr>
         <p:spPr>
           <a:xfrm>
-            <a:off x="-2011286" y="2275159"/>
-            <a:ext cx="1540552" cy="664668"/>
+            <a:off x="317293" y="2791119"/>
+            <a:ext cx="1046263" cy="511180"/>
           </a:xfrm>
           <a:prstGeom prst="ellipse">
             <a:avLst/>
@@ -9160,10 +9152,10 @@
           <a:p>
             <a:pPr algn="ctr"/>
             <a:r>
-              <a:rPr lang="da-DK" sz="1600" dirty="0" smtClean="0"/>
+              <a:rPr lang="da-DK" sz="1100" dirty="0" smtClean="0"/>
               <a:t>JRC</a:t>
             </a:r>
-            <a:endParaRPr lang="da-DK" sz="1600" dirty="0"/>
+            <a:endParaRPr lang="da-DK" sz="1100" dirty="0"/>
           </a:p>
         </p:txBody>
       </p:sp>
@@ -9175,8 +9167,8 @@
         </p:nvSpPr>
         <p:spPr>
           <a:xfrm>
-            <a:off x="9021911" y="-572062"/>
-            <a:ext cx="2684849" cy="860611"/>
+            <a:off x="8618235" y="910781"/>
+            <a:ext cx="1731416" cy="631032"/>
           </a:xfrm>
           <a:prstGeom prst="rect">
             <a:avLst/>
@@ -9204,54 +9196,54 @@
           <a:p>
             <a:pPr algn="ctr"/>
             <a:r>
-              <a:rPr lang="da-DK" sz="1400" dirty="0" err="1" smtClean="0"/>
+              <a:rPr lang="da-DK" sz="1050" dirty="0" err="1" smtClean="0"/>
               <a:t>Extra</a:t>
             </a:r>
             <a:r>
-              <a:rPr lang="da-DK" sz="1400" dirty="0" smtClean="0"/>
+              <a:rPr lang="da-DK" sz="1050" dirty="0" smtClean="0"/>
               <a:t> </a:t>
             </a:r>
             <a:r>
-              <a:rPr lang="da-DK" sz="1400" dirty="0" err="1" smtClean="0"/>
+              <a:rPr lang="da-DK" sz="1050" dirty="0" err="1" smtClean="0"/>
               <a:t>analysis</a:t>
             </a:r>
             <a:r>
-              <a:rPr lang="da-DK" sz="1400" dirty="0" smtClean="0"/>
+              <a:rPr lang="da-DK" sz="1050" dirty="0" smtClean="0"/>
               <a:t> </a:t>
             </a:r>
             <a:r>
-              <a:rPr lang="da-DK" sz="1400" dirty="0" err="1" smtClean="0"/>
+              <a:rPr lang="da-DK" sz="1050" dirty="0" err="1" smtClean="0"/>
               <a:t>e.g</a:t>
             </a:r>
             <a:r>
-              <a:rPr lang="da-DK" sz="1400" dirty="0" smtClean="0"/>
+              <a:rPr lang="da-DK" sz="1050" dirty="0" smtClean="0"/>
               <a:t>. </a:t>
             </a:r>
             <a:r>
-              <a:rPr lang="da-DK" sz="1400" dirty="0" err="1" smtClean="0"/>
+              <a:rPr lang="da-DK" sz="1050" dirty="0" err="1" smtClean="0"/>
               <a:t>effort</a:t>
             </a:r>
             <a:r>
-              <a:rPr lang="da-DK" sz="1400" dirty="0" smtClean="0"/>
+              <a:rPr lang="da-DK" sz="1050" dirty="0" smtClean="0"/>
               <a:t> </a:t>
             </a:r>
             <a:r>
-              <a:rPr lang="da-DK" sz="1400" dirty="0" err="1" smtClean="0"/>
+              <a:rPr lang="da-DK" sz="1050" dirty="0" err="1" smtClean="0"/>
               <a:t>allocation</a:t>
             </a:r>
             <a:r>
-              <a:rPr lang="da-DK" sz="1400" dirty="0" smtClean="0"/>
+              <a:rPr lang="da-DK" sz="1050" dirty="0" smtClean="0"/>
               <a:t> </a:t>
             </a:r>
             <a:r>
-              <a:rPr lang="da-DK" sz="1400" dirty="0" err="1" smtClean="0"/>
+              <a:rPr lang="da-DK" sz="1050" dirty="0" err="1" smtClean="0"/>
               <a:t>variability</a:t>
             </a:r>
             <a:r>
-              <a:rPr lang="da-DK" sz="1400" dirty="0" smtClean="0"/>
+              <a:rPr lang="da-DK" sz="1050" dirty="0" smtClean="0"/>
               <a:t>?</a:t>
             </a:r>
-            <a:endParaRPr lang="da-DK" dirty="0"/>
+            <a:endParaRPr lang="da-DK" sz="1200" dirty="0"/>
           </a:p>
         </p:txBody>
       </p:sp>
@@ -9265,9 +9257,9 @@
           <p:nvPr/>
         </p:nvCxnSpPr>
         <p:spPr>
-          <a:xfrm flipV="1">
-            <a:off x="8076418" y="-141756"/>
-            <a:ext cx="945493" cy="2438"/>
+          <a:xfrm>
+            <a:off x="8056921" y="1221436"/>
+            <a:ext cx="561314" cy="4861"/>
           </a:xfrm>
           <a:prstGeom prst="bentConnector3">
             <a:avLst>
@@ -9301,8 +9293,8 @@
         </p:nvSpPr>
         <p:spPr>
           <a:xfrm>
-            <a:off x="-2221673" y="760674"/>
-            <a:ext cx="3776996" cy="923330"/>
+            <a:off x="543133" y="1661551"/>
+            <a:ext cx="3554439" cy="646331"/>
           </a:xfrm>
           <a:prstGeom prst="rect">
             <a:avLst/>
@@ -9310,60 +9302,60 @@
           <a:noFill/>
         </p:spPr>
         <p:txBody>
-          <a:bodyPr wrap="none" rtlCol="0">
+          <a:bodyPr wrap="square" rtlCol="0">
             <a:spAutoFit/>
           </a:bodyPr>
           <a:lstStyle/>
           <a:p>
             <a:r>
-              <a:rPr lang="da-DK" dirty="0" err="1" smtClean="0"/>
+              <a:rPr lang="da-DK" sz="1200" dirty="0" err="1" smtClean="0"/>
               <a:t>ToR</a:t>
             </a:r>
             <a:r>
-              <a:rPr lang="da-DK" dirty="0" smtClean="0"/>
+              <a:rPr lang="da-DK" sz="1200" dirty="0" smtClean="0"/>
               <a:t> (</a:t>
             </a:r>
             <a:r>
-              <a:rPr lang="da-DK" dirty="0" err="1" smtClean="0"/>
+              <a:rPr lang="da-DK" sz="1200" dirty="0" err="1" smtClean="0"/>
               <a:t>a,d</a:t>
             </a:r>
             <a:r>
-              <a:rPr lang="da-DK" dirty="0" smtClean="0"/>
+              <a:rPr lang="da-DK" sz="1200" dirty="0" smtClean="0"/>
               <a:t>) Practical steps: </a:t>
             </a:r>
           </a:p>
           <a:p>
             <a:r>
-              <a:rPr lang="da-DK" dirty="0" err="1" smtClean="0"/>
+              <a:rPr lang="da-DK" sz="1200" dirty="0" err="1" smtClean="0"/>
               <a:t>prioritisation</a:t>
             </a:r>
             <a:r>
-              <a:rPr lang="da-DK" dirty="0" smtClean="0"/>
+              <a:rPr lang="da-DK" sz="1200" dirty="0" smtClean="0"/>
               <a:t>, data </a:t>
             </a:r>
             <a:r>
-              <a:rPr lang="da-DK" dirty="0" err="1" smtClean="0"/>
+              <a:rPr lang="da-DK" sz="1200" dirty="0" err="1" smtClean="0"/>
               <a:t>availability</a:t>
             </a:r>
             <a:r>
-              <a:rPr lang="da-DK" dirty="0" smtClean="0"/>
+              <a:rPr lang="da-DK" sz="1200" dirty="0" smtClean="0"/>
               <a:t>,</a:t>
             </a:r>
           </a:p>
           <a:p>
             <a:r>
-              <a:rPr lang="da-DK" dirty="0" err="1" smtClean="0"/>
+              <a:rPr lang="da-DK" sz="1200" dirty="0" err="1" smtClean="0"/>
               <a:t>Feasability</a:t>
             </a:r>
             <a:r>
-              <a:rPr lang="da-DK" dirty="0" smtClean="0"/>
+              <a:rPr lang="da-DK" sz="1200" dirty="0" smtClean="0"/>
               <a:t>, future data </a:t>
             </a:r>
             <a:r>
-              <a:rPr lang="da-DK" dirty="0" err="1" smtClean="0"/>
+              <a:rPr lang="da-DK" sz="1200" dirty="0" err="1" smtClean="0"/>
               <a:t>collation</a:t>
             </a:r>
-            <a:endParaRPr lang="da-DK" dirty="0"/>
+            <a:endParaRPr lang="da-DK" sz="1200" dirty="0"/>
           </a:p>
         </p:txBody>
       </p:sp>
@@ -9375,8 +9367,8 @@
         </p:nvSpPr>
         <p:spPr>
           <a:xfrm>
-            <a:off x="530377" y="5325142"/>
-            <a:ext cx="5052986" cy="646331"/>
+            <a:off x="2467429" y="6295919"/>
+            <a:ext cx="3554348" cy="461665"/>
           </a:xfrm>
           <a:prstGeom prst="rect">
             <a:avLst/>
@@ -9384,46 +9376,46 @@
           <a:noFill/>
         </p:spPr>
         <p:txBody>
-          <a:bodyPr wrap="none" rtlCol="0">
+          <a:bodyPr wrap="square" rtlCol="0">
             <a:spAutoFit/>
           </a:bodyPr>
           <a:lstStyle/>
           <a:p>
             <a:r>
-              <a:rPr lang="da-DK" dirty="0" err="1" smtClean="0"/>
+              <a:rPr lang="da-DK" sz="1200" dirty="0" err="1" smtClean="0"/>
               <a:t>ToR</a:t>
             </a:r>
             <a:r>
-              <a:rPr lang="da-DK" dirty="0" smtClean="0"/>
+              <a:rPr lang="da-DK" sz="1200" dirty="0" smtClean="0"/>
               <a:t> (b) –Case studies</a:t>
             </a:r>
           </a:p>
           <a:p>
             <a:r>
-              <a:rPr lang="da-DK" dirty="0" smtClean="0"/>
+              <a:rPr lang="da-DK" sz="1200" dirty="0" smtClean="0"/>
               <a:t> for </a:t>
             </a:r>
             <a:r>
-              <a:rPr lang="da-DK" dirty="0" err="1" smtClean="0"/>
+              <a:rPr lang="da-DK" sz="1200" dirty="0" err="1" smtClean="0"/>
               <a:t>disaggregation</a:t>
             </a:r>
             <a:r>
-              <a:rPr lang="da-DK" dirty="0" smtClean="0"/>
+              <a:rPr lang="da-DK" sz="1200" dirty="0" smtClean="0"/>
               <a:t> to the right </a:t>
             </a:r>
             <a:r>
-              <a:rPr lang="da-DK" dirty="0" err="1" smtClean="0"/>
+              <a:rPr lang="da-DK" sz="1200" dirty="0" err="1" smtClean="0"/>
               <a:t>spatial</a:t>
             </a:r>
             <a:r>
-              <a:rPr lang="da-DK" dirty="0" smtClean="0"/>
+              <a:rPr lang="da-DK" sz="1200" dirty="0" smtClean="0"/>
               <a:t> </a:t>
             </a:r>
             <a:r>
-              <a:rPr lang="da-DK" dirty="0" err="1" smtClean="0"/>
+              <a:rPr lang="da-DK" sz="1200" dirty="0" err="1" smtClean="0"/>
               <a:t>scale</a:t>
             </a:r>
-            <a:endParaRPr lang="da-DK" dirty="0"/>
+            <a:endParaRPr lang="da-DK" sz="1200" dirty="0"/>
           </a:p>
         </p:txBody>
       </p:sp>
@@ -9435,8 +9427,8 @@
         </p:nvSpPr>
         <p:spPr>
           <a:xfrm>
-            <a:off x="8956357" y="746810"/>
-            <a:ext cx="3857426" cy="1200329"/>
+            <a:off x="9203589" y="1943569"/>
+            <a:ext cx="1951141" cy="830997"/>
           </a:xfrm>
           <a:prstGeom prst="rect">
             <a:avLst/>
@@ -9450,64 +9442,64 @@
           <a:lstStyle/>
           <a:p>
             <a:r>
-              <a:rPr lang="da-DK" dirty="0" err="1" smtClean="0"/>
+              <a:rPr lang="da-DK" sz="1200" dirty="0" err="1" smtClean="0"/>
               <a:t>ToR</a:t>
             </a:r>
             <a:r>
-              <a:rPr lang="da-DK" dirty="0" smtClean="0"/>
+              <a:rPr lang="da-DK" sz="1200" dirty="0" smtClean="0"/>
               <a:t> (c) – </a:t>
             </a:r>
             <a:r>
-              <a:rPr lang="da-DK" dirty="0" err="1" smtClean="0"/>
+              <a:rPr lang="da-DK" sz="1200" dirty="0" err="1" smtClean="0"/>
               <a:t>Obtain</a:t>
             </a:r>
             <a:r>
-              <a:rPr lang="da-DK" dirty="0" smtClean="0"/>
+              <a:rPr lang="da-DK" sz="1200" dirty="0" smtClean="0"/>
               <a:t> </a:t>
             </a:r>
           </a:p>
           <a:p>
             <a:r>
-              <a:rPr lang="da-DK" dirty="0" err="1" smtClean="0"/>
+              <a:rPr lang="da-DK" sz="1200" dirty="0" err="1" smtClean="0"/>
               <a:t>probability</a:t>
             </a:r>
             <a:r>
-              <a:rPr lang="da-DK" dirty="0" smtClean="0"/>
+              <a:rPr lang="da-DK" sz="1200" dirty="0" smtClean="0"/>
               <a:t> </a:t>
             </a:r>
             <a:r>
-              <a:rPr lang="da-DK" dirty="0" err="1" smtClean="0"/>
+              <a:rPr lang="da-DK" sz="1200" dirty="0" err="1" smtClean="0"/>
               <a:t>fields</a:t>
             </a:r>
             <a:r>
-              <a:rPr lang="da-DK" dirty="0" smtClean="0"/>
+              <a:rPr lang="da-DK" sz="1200" dirty="0" smtClean="0"/>
               <a:t> for </a:t>
             </a:r>
             <a:r>
-              <a:rPr lang="da-DK" dirty="0" err="1" smtClean="0"/>
+              <a:rPr lang="da-DK" sz="1200" dirty="0" err="1" smtClean="0"/>
               <a:t>displacement</a:t>
             </a:r>
             <a:r>
-              <a:rPr lang="da-DK" dirty="0" smtClean="0"/>
+              <a:rPr lang="da-DK" sz="1200" dirty="0" smtClean="0"/>
               <a:t> in </a:t>
             </a:r>
             <a:r>
-              <a:rPr lang="da-DK" dirty="0" err="1" smtClean="0"/>
+              <a:rPr lang="da-DK" sz="1200" dirty="0" err="1" smtClean="0"/>
               <a:t>reaction</a:t>
             </a:r>
             <a:r>
-              <a:rPr lang="da-DK" dirty="0" smtClean="0"/>
+              <a:rPr lang="da-DK" sz="1200" dirty="0" smtClean="0"/>
               <a:t> to </a:t>
             </a:r>
             <a:r>
-              <a:rPr lang="da-DK" dirty="0" err="1" smtClean="0"/>
+              <a:rPr lang="da-DK" sz="1200" dirty="0" err="1" smtClean="0"/>
               <a:t>effort</a:t>
             </a:r>
             <a:r>
-              <a:rPr lang="da-DK" dirty="0" smtClean="0"/>
+              <a:rPr lang="da-DK" sz="1200" dirty="0" smtClean="0"/>
               <a:t> cut</a:t>
             </a:r>
-            <a:endParaRPr lang="da-DK" dirty="0"/>
+            <a:endParaRPr lang="da-DK" sz="1200" dirty="0"/>
           </a:p>
         </p:txBody>
       </p:sp>
@@ -9522,12 +9514,12 @@
         </p:nvCxnSpPr>
         <p:spPr>
           <a:xfrm rot="16200000" flipV="1">
-            <a:off x="8740864" y="-2195535"/>
-            <a:ext cx="51350" cy="3195595"/>
+            <a:off x="8433910" y="-139252"/>
+            <a:ext cx="28549" cy="2071518"/>
           </a:xfrm>
           <a:prstGeom prst="bentConnector3">
             <a:avLst>
-              <a:gd name="adj1" fmla="val 313914"/>
+              <a:gd name="adj1" fmla="val 900729"/>
             </a:avLst>
           </a:prstGeom>
           <a:ln>
@@ -9553,14 +9545,15 @@
         <p:nvCxnSpPr>
           <p:cNvPr id="76" name="Elbow Connector 75"/>
           <p:cNvCxnSpPr>
+            <a:stCxn id="68" idx="2"/>
             <a:endCxn id="81" idx="1"/>
           </p:cNvCxnSpPr>
           <p:nvPr/>
         </p:nvCxnSpPr>
         <p:spPr>
           <a:xfrm rot="16200000" flipH="1">
-            <a:off x="6532363" y="4374294"/>
-            <a:ext cx="1455326" cy="536195"/>
+            <a:off x="6969012" y="3974281"/>
+            <a:ext cx="1164771" cy="268334"/>
           </a:xfrm>
           <a:prstGeom prst="bentConnector2">
             <a:avLst/>
@@ -9592,8 +9585,8 @@
         </p:nvSpPr>
         <p:spPr>
           <a:xfrm>
-            <a:off x="3335979" y="-342024"/>
-            <a:ext cx="1815354" cy="968188"/>
+            <a:off x="4692970" y="532465"/>
+            <a:ext cx="1166334" cy="654484"/>
           </a:xfrm>
           <a:prstGeom prst="ellipse">
             <a:avLst/>
@@ -9621,18 +9614,18 @@
           <a:p>
             <a:pPr algn="ctr"/>
             <a:r>
-              <a:rPr lang="da-DK" sz="1400" dirty="0" smtClean="0"/>
+              <a:rPr lang="da-DK" sz="1050" dirty="0" smtClean="0"/>
               <a:t>Raster </a:t>
             </a:r>
             <a:r>
-              <a:rPr lang="da-DK" sz="1400" dirty="0" err="1"/>
+              <a:rPr lang="da-DK" sz="1050" dirty="0" err="1"/>
               <a:t>e</a:t>
             </a:r>
             <a:r>
-              <a:rPr lang="da-DK" sz="1400" dirty="0" err="1" smtClean="0"/>
+              <a:rPr lang="da-DK" sz="1050" dirty="0" err="1" smtClean="0"/>
               <a:t>ffortForecast</a:t>
             </a:r>
-            <a:endParaRPr lang="da-DK" sz="1400" dirty="0"/>
+            <a:endParaRPr lang="da-DK" sz="1050" dirty="0"/>
           </a:p>
         </p:txBody>
       </p:sp>
@@ -9646,13 +9639,13 @@
           <p:nvPr/>
         </p:nvCxnSpPr>
         <p:spPr>
-          <a:xfrm rot="16200000" flipH="1" flipV="1">
-            <a:off x="2761607" y="-4203606"/>
-            <a:ext cx="43328" cy="7487291"/>
+          <a:xfrm rot="16200000" flipV="1">
+            <a:off x="3796032" y="-2179084"/>
+            <a:ext cx="687303" cy="5634031"/>
           </a:xfrm>
           <a:prstGeom prst="bentConnector3">
             <a:avLst>
-              <a:gd name="adj1" fmla="val -854847"/>
+              <a:gd name="adj1" fmla="val 133260"/>
             </a:avLst>
           </a:prstGeom>
           <a:ln>
@@ -9685,8 +9678,8 @@
         </p:nvCxnSpPr>
         <p:spPr>
           <a:xfrm>
-            <a:off x="5151333" y="142070"/>
-            <a:ext cx="310477" cy="2081884"/>
+            <a:off x="5859304" y="859707"/>
+            <a:ext cx="318546" cy="1474293"/>
           </a:xfrm>
           <a:prstGeom prst="bentConnector3">
             <a:avLst>
@@ -9723,8 +9716,8 @@
         </p:nvCxnSpPr>
         <p:spPr>
           <a:xfrm>
-            <a:off x="490484" y="128443"/>
-            <a:ext cx="199917" cy="6342"/>
+            <a:off x="2260757" y="859707"/>
+            <a:ext cx="433491" cy="1"/>
           </a:xfrm>
           <a:prstGeom prst="bentConnector3">
             <a:avLst/>
@@ -9758,9 +9751,9 @@
           <p:nvPr/>
         </p:nvCxnSpPr>
         <p:spPr>
-          <a:xfrm>
-            <a:off x="3175333" y="134785"/>
-            <a:ext cx="160646" cy="7285"/>
+          <a:xfrm flipV="1">
+            <a:off x="4291131" y="859707"/>
+            <a:ext cx="401839" cy="1"/>
           </a:xfrm>
           <a:prstGeom prst="bentConnector3">
             <a:avLst/>
@@ -9792,8 +9785,8 @@
         </p:nvSpPr>
         <p:spPr>
           <a:xfrm>
-            <a:off x="-2411234" y="-438296"/>
-            <a:ext cx="2901718" cy="1133478"/>
+            <a:off x="384577" y="294280"/>
+            <a:ext cx="1876180" cy="1130853"/>
           </a:xfrm>
           <a:prstGeom prst="ellipse">
             <a:avLst/>
@@ -9821,22 +9814,22 @@
           <a:p>
             <a:pPr algn="ctr"/>
             <a:r>
-              <a:rPr lang="da-DK" sz="1200" dirty="0"/>
+              <a:rPr lang="da-DK" sz="1000" dirty="0"/>
               <a:t>SPATIAL LONG TERM DYNAMIC MODELLING </a:t>
             </a:r>
             <a:r>
-              <a:rPr lang="da-DK" sz="1200" dirty="0" smtClean="0"/>
+              <a:rPr lang="da-DK" sz="1000" dirty="0" smtClean="0"/>
               <a:t>(DISPLACE/SMART/</a:t>
             </a:r>
             <a:r>
-              <a:rPr lang="da-DK" sz="1200" dirty="0" err="1" smtClean="0"/>
+              <a:rPr lang="da-DK" sz="1000" dirty="0" err="1" smtClean="0"/>
               <a:t>FishRent</a:t>
             </a:r>
             <a:r>
-              <a:rPr lang="da-DK" sz="1200" dirty="0" smtClean="0"/>
+              <a:rPr lang="da-DK" sz="1000" dirty="0" smtClean="0"/>
               <a:t>)</a:t>
             </a:r>
-            <a:endParaRPr lang="da-DK" sz="1200" dirty="0"/>
+            <a:endParaRPr lang="da-DK" sz="1000" dirty="0"/>
           </a:p>
         </p:txBody>
       </p:sp>
@@ -9848,8 +9841,8 @@
         </p:nvSpPr>
         <p:spPr>
           <a:xfrm>
-            <a:off x="-59867" y="4974526"/>
-            <a:ext cx="2763983" cy="301216"/>
+            <a:off x="1869267" y="5371767"/>
+            <a:ext cx="2067416" cy="301216"/>
           </a:xfrm>
           <a:prstGeom prst="rect">
             <a:avLst/>
@@ -9877,10 +9870,10 @@
           <a:p>
             <a:pPr algn="ctr"/>
             <a:r>
-              <a:rPr lang="da-DK" sz="1400" dirty="0" smtClean="0"/>
+              <a:rPr lang="da-DK" sz="1050" dirty="0" smtClean="0"/>
               <a:t>Etc.</a:t>
             </a:r>
-            <a:endParaRPr lang="da-DK" sz="1400" dirty="0"/>
+            <a:endParaRPr lang="da-DK" sz="1050" dirty="0"/>
           </a:p>
         </p:txBody>
       </p:sp>
@@ -9892,8 +9885,8 @@
         </p:nvSpPr>
         <p:spPr>
           <a:xfrm>
-            <a:off x="3386738" y="4854218"/>
-            <a:ext cx="1481777" cy="748339"/>
+            <a:off x="4783800" y="4905214"/>
+            <a:ext cx="1001772" cy="566252"/>
           </a:xfrm>
           <a:prstGeom prst="ellipse">
             <a:avLst/>
@@ -9921,10 +9914,10 @@
           <a:p>
             <a:pPr algn="ctr"/>
             <a:r>
-              <a:rPr lang="da-DK" sz="1400" dirty="0" smtClean="0"/>
+              <a:rPr lang="da-DK" sz="1050" dirty="0" smtClean="0"/>
               <a:t>Raster Profit</a:t>
             </a:r>
-            <a:endParaRPr lang="da-DK" sz="1400" dirty="0"/>
+            <a:endParaRPr lang="da-DK" sz="1050" dirty="0"/>
           </a:p>
         </p:txBody>
       </p:sp>
@@ -9939,8 +9932,8 @@
         </p:nvCxnSpPr>
         <p:spPr>
           <a:xfrm>
-            <a:off x="2711373" y="4646604"/>
-            <a:ext cx="675365" cy="581784"/>
+            <a:off x="3936683" y="4565901"/>
+            <a:ext cx="847117" cy="622439"/>
           </a:xfrm>
           <a:prstGeom prst="bentConnector3">
             <a:avLst/>
@@ -9975,8 +9968,284 @@
         </p:nvCxnSpPr>
         <p:spPr>
           <a:xfrm flipV="1">
-            <a:off x="4868515" y="2223954"/>
-            <a:ext cx="593295" cy="3004434"/>
+            <a:off x="5785572" y="2334000"/>
+            <a:ext cx="392278" cy="2854340"/>
+          </a:xfrm>
+          <a:prstGeom prst="bentConnector3">
+            <a:avLst/>
+          </a:prstGeom>
+          <a:ln>
+            <a:tailEnd type="triangle"/>
+          </a:ln>
+        </p:spPr>
+        <p:style>
+          <a:lnRef idx="1">
+            <a:schemeClr val="accent1"/>
+          </a:lnRef>
+          <a:fillRef idx="0">
+            <a:schemeClr val="accent1"/>
+          </a:fillRef>
+          <a:effectRef idx="0">
+            <a:schemeClr val="accent1"/>
+          </a:effectRef>
+          <a:fontRef idx="minor">
+            <a:schemeClr val="tx1"/>
+          </a:fontRef>
+        </p:style>
+      </p:cxnSp>
+      <p:sp>
+        <p:nvSpPr>
+          <p:cNvPr id="61" name="Rectangle 60"/>
+          <p:cNvSpPr/>
+          <p:nvPr/>
+        </p:nvSpPr>
+        <p:spPr>
+          <a:xfrm>
+            <a:off x="9314217" y="5428015"/>
+            <a:ext cx="2169653" cy="568663"/>
+          </a:xfrm>
+          <a:prstGeom prst="rect">
+            <a:avLst/>
+          </a:prstGeom>
+        </p:spPr>
+        <p:style>
+          <a:lnRef idx="2">
+            <a:schemeClr val="accent1">
+              <a:shade val="50000"/>
+            </a:schemeClr>
+          </a:lnRef>
+          <a:fillRef idx="1">
+            <a:schemeClr val="accent1"/>
+          </a:fillRef>
+          <a:effectRef idx="0">
+            <a:schemeClr val="accent1"/>
+          </a:effectRef>
+          <a:fontRef idx="minor">
+            <a:schemeClr val="lt1"/>
+          </a:fontRef>
+        </p:style>
+        <p:txBody>
+          <a:bodyPr rtlCol="0" anchor="ctr"/>
+          <a:lstStyle/>
+          <a:p>
+            <a:pPr algn="ctr"/>
+            <a:r>
+              <a:rPr lang="da-DK" sz="1050" dirty="0" err="1" smtClean="0"/>
+              <a:t>Impact</a:t>
+            </a:r>
+            <a:r>
+              <a:rPr lang="da-DK" sz="1050" dirty="0" smtClean="0"/>
+              <a:t> </a:t>
+            </a:r>
+            <a:r>
+              <a:rPr lang="da-DK" sz="1050" dirty="0" err="1" smtClean="0"/>
+              <a:t>evaluation</a:t>
+            </a:r>
+            <a:r>
+              <a:rPr lang="da-DK" sz="1050" dirty="0"/>
+              <a:t> with </a:t>
+            </a:r>
+            <a:r>
+              <a:rPr lang="da-DK" sz="1050" dirty="0" smtClean="0"/>
+              <a:t>SPATIAL </a:t>
+            </a:r>
+            <a:r>
+              <a:rPr lang="da-DK" sz="1050" dirty="0"/>
+              <a:t>LONG TERM DYNAMICS </a:t>
+            </a:r>
+            <a:r>
+              <a:rPr lang="da-DK" sz="1050" dirty="0" smtClean="0"/>
+              <a:t>MODELLING</a:t>
+            </a:r>
+            <a:endParaRPr lang="da-DK" sz="1050" dirty="0"/>
+          </a:p>
+          <a:p>
+            <a:pPr algn="ctr"/>
+            <a:endParaRPr lang="da-DK" sz="1050" dirty="0"/>
+          </a:p>
+        </p:txBody>
+      </p:sp>
+      <p:cxnSp>
+        <p:nvCxnSpPr>
+          <p:cNvPr id="11" name="Elbow Connector 10"/>
+          <p:cNvCxnSpPr>
+            <a:stCxn id="69" idx="3"/>
+            <a:endCxn id="61" idx="3"/>
+          </p:cNvCxnSpPr>
+          <p:nvPr/>
+        </p:nvCxnSpPr>
+        <p:spPr>
+          <a:xfrm>
+            <a:off x="11293175" y="3368696"/>
+            <a:ext cx="190695" cy="2343651"/>
+          </a:xfrm>
+          <a:prstGeom prst="bentConnector3">
+            <a:avLst>
+              <a:gd name="adj1" fmla="val 219877"/>
+            </a:avLst>
+          </a:prstGeom>
+          <a:ln>
+            <a:tailEnd type="triangle"/>
+          </a:ln>
+        </p:spPr>
+        <p:style>
+          <a:lnRef idx="1">
+            <a:schemeClr val="accent1"/>
+          </a:lnRef>
+          <a:fillRef idx="0">
+            <a:schemeClr val="accent1"/>
+          </a:fillRef>
+          <a:effectRef idx="0">
+            <a:schemeClr val="accent1"/>
+          </a:effectRef>
+          <a:fontRef idx="minor">
+            <a:schemeClr val="tx1"/>
+          </a:fontRef>
+        </p:style>
+      </p:cxnSp>
+      <p:cxnSp>
+        <p:nvCxnSpPr>
+          <p:cNvPr id="14" name="Elbow Connector 13"/>
+          <p:cNvCxnSpPr>
+            <a:stCxn id="61" idx="2"/>
+            <a:endCxn id="81" idx="2"/>
+          </p:cNvCxnSpPr>
+          <p:nvPr/>
+        </p:nvCxnSpPr>
+        <p:spPr>
+          <a:xfrm rot="5400000" flipH="1">
+            <a:off x="9119084" y="4716718"/>
+            <a:ext cx="885222" cy="1674699"/>
+          </a:xfrm>
+          <a:prstGeom prst="bentConnector3">
+            <a:avLst>
+              <a:gd name="adj1" fmla="val -25824"/>
+            </a:avLst>
+          </a:prstGeom>
+          <a:ln>
+            <a:tailEnd type="triangle"/>
+          </a:ln>
+        </p:spPr>
+        <p:style>
+          <a:lnRef idx="1">
+            <a:schemeClr val="accent1"/>
+          </a:lnRef>
+          <a:fillRef idx="0">
+            <a:schemeClr val="accent1"/>
+          </a:fillRef>
+          <a:effectRef idx="0">
+            <a:schemeClr val="accent1"/>
+          </a:effectRef>
+          <a:fontRef idx="minor">
+            <a:schemeClr val="tx1"/>
+          </a:fontRef>
+        </p:style>
+      </p:cxnSp>
+      <p:sp>
+        <p:nvSpPr>
+          <p:cNvPr id="100" name="Rectangle 99"/>
+          <p:cNvSpPr/>
+          <p:nvPr/>
+        </p:nvSpPr>
+        <p:spPr>
+          <a:xfrm>
+            <a:off x="1879768" y="4873150"/>
+            <a:ext cx="2053346" cy="373471"/>
+          </a:xfrm>
+          <a:prstGeom prst="rect">
+            <a:avLst/>
+          </a:prstGeom>
+        </p:spPr>
+        <p:style>
+          <a:lnRef idx="2">
+            <a:schemeClr val="accent1">
+              <a:shade val="50000"/>
+            </a:schemeClr>
+          </a:lnRef>
+          <a:fillRef idx="1">
+            <a:schemeClr val="accent1"/>
+          </a:fillRef>
+          <a:effectRef idx="0">
+            <a:schemeClr val="accent1"/>
+          </a:effectRef>
+          <a:fontRef idx="minor">
+            <a:schemeClr val="lt1"/>
+          </a:fontRef>
+        </p:style>
+        <p:txBody>
+          <a:bodyPr rtlCol="0" anchor="ctr"/>
+          <a:lstStyle/>
+          <a:p>
+            <a:pPr algn="ctr"/>
+            <a:r>
+              <a:rPr lang="da-DK" sz="1050" dirty="0" err="1" smtClean="0"/>
+              <a:t>ObtainWindmillsFarms</a:t>
+            </a:r>
+            <a:endParaRPr lang="da-DK" sz="1050" dirty="0"/>
+          </a:p>
+        </p:txBody>
+      </p:sp>
+      <p:sp>
+        <p:nvSpPr>
+          <p:cNvPr id="129" name="Oval 128"/>
+          <p:cNvSpPr/>
+          <p:nvPr/>
+        </p:nvSpPr>
+        <p:spPr>
+          <a:xfrm>
+            <a:off x="4783178" y="5530303"/>
+            <a:ext cx="1001772" cy="566252"/>
+          </a:xfrm>
+          <a:prstGeom prst="ellipse">
+            <a:avLst/>
+          </a:prstGeom>
+        </p:spPr>
+        <p:style>
+          <a:lnRef idx="2">
+            <a:schemeClr val="accent1">
+              <a:shade val="50000"/>
+            </a:schemeClr>
+          </a:lnRef>
+          <a:fillRef idx="1">
+            <a:schemeClr val="accent1"/>
+          </a:fillRef>
+          <a:effectRef idx="0">
+            <a:schemeClr val="accent1"/>
+          </a:effectRef>
+          <a:fontRef idx="minor">
+            <a:schemeClr val="lt1"/>
+          </a:fontRef>
+        </p:style>
+        <p:txBody>
+          <a:bodyPr rtlCol="0" anchor="ctr"/>
+          <a:lstStyle/>
+          <a:p>
+            <a:pPr algn="ctr"/>
+            <a:r>
+              <a:rPr lang="da-DK" sz="1050" dirty="0" smtClean="0"/>
+              <a:t>Raster </a:t>
+            </a:r>
+            <a:r>
+              <a:rPr lang="da-DK" sz="1050" dirty="0" err="1" smtClean="0"/>
+              <a:t>Windmills</a:t>
+            </a:r>
+            <a:endParaRPr lang="da-DK" sz="1050" dirty="0"/>
+          </a:p>
+        </p:txBody>
+      </p:sp>
+      <p:cxnSp>
+        <p:nvCxnSpPr>
+          <p:cNvPr id="130" name="Elbow Connector 129"/>
+          <p:cNvCxnSpPr>
+            <a:stCxn id="100" idx="3"/>
+            <a:endCxn id="129" idx="2"/>
+          </p:cNvCxnSpPr>
+          <p:nvPr/>
+        </p:nvCxnSpPr>
+        <p:spPr>
+          <a:xfrm>
+            <a:off x="3933114" y="5059886"/>
+            <a:ext cx="850064" cy="753543"/>
           </a:xfrm>
           <a:prstGeom prst="bentConnector3">
             <a:avLst/>

</xml_diff>